<commit_message>
correzioni post simulazione di presentazione ;)
</commit_message>
<xml_diff>
--- a/compito1/myTEDx languages.pptx
+++ b/compito1/myTEDx languages.pptx
@@ -1,6 +1,6 @@
 
 <file path=ppt/presentation.xml><?xml version="1.0" encoding="utf-8"?>
-<p:presentation xmlns:a="http://schemas.openxmlformats.org/drawingml/2006/main" xmlns:r="http://schemas.openxmlformats.org/officeDocument/2006/relationships" xmlns:mc="http://schemas.openxmlformats.org/markup-compatibility/2006" xmlns:mv="urn:schemas-microsoft-com:mac:vml" xmlns:p="http://schemas.openxmlformats.org/presentationml/2006/main" xmlns:c="http://schemas.openxmlformats.org/drawingml/2006/chart" xmlns:dgm="http://schemas.openxmlformats.org/drawingml/2006/diagram" xmlns:o="urn:schemas-microsoft-com:office:office" xmlns:v="urn:schemas-microsoft-com:vml" xmlns:pvml="urn:schemas-microsoft-com:office:powerpoint" xmlns:com="http://schemas.openxmlformats.org/drawingml/2006/compatibility" xmlns:p14="http://schemas.microsoft.com/office/powerpoint/2010/main" xmlns:p15="http://schemas.microsoft.com/office/powerpoint/2012/main" autoCompressPictures="0" embedTrueTypeFonts="1" strictFirstAndLastChars="0" saveSubsetFonts="1">
+<p:presentation xmlns:a="http://schemas.openxmlformats.org/drawingml/2006/main" xmlns:r="http://schemas.openxmlformats.org/officeDocument/2006/relationships" xmlns:mc="http://schemas.openxmlformats.org/markup-compatibility/2006" xmlns:mv="urn:schemas-microsoft-com:mac:vml" xmlns:p="http://schemas.openxmlformats.org/presentationml/2006/main" xmlns:c="http://schemas.openxmlformats.org/drawingml/2006/chart" xmlns:dgm="http://schemas.openxmlformats.org/drawingml/2006/diagram" xmlns:o="urn:schemas-microsoft-com:office:office" xmlns:v="urn:schemas-microsoft-com:vml" xmlns:pvml="urn:schemas-microsoft-com:office:powerpoint" xmlns:com="http://schemas.openxmlformats.org/drawingml/2006/compatibility" xmlns:p14="http://schemas.microsoft.com/office/powerpoint/2010/main" xmlns:p15="http://schemas.microsoft.com/office/powerpoint/2012/main" autoCompressPictures="0" strictFirstAndLastChars="0" saveSubsetFonts="1">
   <p:sldMasterIdLst>
     <p:sldMasterId id="2147483663" r:id="rId4"/>
   </p:sldMasterIdLst>
@@ -19,23 +19,9 @@
     <p:sldId id="264" r:id="rId14"/>
     <p:sldId id="265" r:id="rId15"/>
     <p:sldId id="266" r:id="rId16"/>
-    <p:sldId id="267" r:id="rId17"/>
   </p:sldIdLst>
   <p:sldSz cy="5143500" cx="9144000"/>
   <p:notesSz cx="6858000" cy="9144000"/>
-  <p:embeddedFontLst>
-    <p:embeddedFont>
-      <p:font typeface="Montserrat"/>
-      <p:regular r:id="rId18"/>
-      <p:bold r:id="rId19"/>
-      <p:italic r:id="rId20"/>
-      <p:boldItalic r:id="rId21"/>
-    </p:embeddedFont>
-    <p:embeddedFont>
-      <p:font typeface="Average"/>
-      <p:regular r:id="rId22"/>
-    </p:embeddedFont>
-  </p:embeddedFontLst>
   <p:defaultTextStyle>
     <a:defPPr lvl="0" marR="0" rtl="0" algn="l">
       <a:lnSpc>
@@ -814,7 +800,7 @@
   <p:cSld>
     <p:spTree>
       <p:nvGrpSpPr>
-        <p:cNvPr id="165" name="Shape 165"/>
+        <p:cNvPr id="167" name="Shape 167"/>
         <p:cNvGrpSpPr/>
         <p:nvPr/>
       </p:nvGrpSpPr>
@@ -828,7 +814,7 @@
       </p:grpSpPr>
       <p:sp>
         <p:nvSpPr>
-          <p:cNvPr id="166" name="Google Shape;166;g1f87997393_0_848:notes"/>
+          <p:cNvPr id="168" name="Google Shape;168;g86054d7627_0_40:notes"/>
           <p:cNvSpPr/>
           <p:nvPr>
             <p:ph idx="2" type="sldImg"/>
@@ -863,7 +849,7 @@
       </p:sp>
       <p:sp>
         <p:nvSpPr>
-          <p:cNvPr id="167" name="Google Shape;167;g1f87997393_0_848:notes"/>
+          <p:cNvPr id="169" name="Google Shape;169;g86054d7627_0_40:notes"/>
           <p:cNvSpPr txBox="1"/>
           <p:nvPr>
             <p:ph idx="1" type="body"/>
@@ -913,7 +899,7 @@
   <p:cSld>
     <p:spTree>
       <p:nvGrpSpPr>
-        <p:cNvPr id="174" name="Shape 174"/>
+        <p:cNvPr id="173" name="Shape 173"/>
         <p:cNvGrpSpPr/>
         <p:nvPr/>
       </p:nvGrpSpPr>
@@ -927,7 +913,7 @@
       </p:grpSpPr>
       <p:sp>
         <p:nvSpPr>
-          <p:cNvPr id="175" name="Google Shape;175;g86054d7627_0_40:notes"/>
+          <p:cNvPr id="174" name="Google Shape;174;g86054d7627_0_45:notes"/>
           <p:cNvSpPr/>
           <p:nvPr>
             <p:ph idx="2" type="sldImg"/>
@@ -962,106 +948,7 @@
       </p:sp>
       <p:sp>
         <p:nvSpPr>
-          <p:cNvPr id="176" name="Google Shape;176;g86054d7627_0_40:notes"/>
-          <p:cNvSpPr txBox="1"/>
-          <p:nvPr>
-            <p:ph idx="1" type="body"/>
-          </p:nvPr>
-        </p:nvSpPr>
-        <p:spPr>
-          <a:xfrm>
-            <a:off x="685800" y="4343400"/>
-            <a:ext cx="5486400" cy="4114800"/>
-          </a:xfrm>
-          <a:prstGeom prst="rect">
-            <a:avLst/>
-          </a:prstGeom>
-        </p:spPr>
-        <p:txBody>
-          <a:bodyPr anchorCtr="0" anchor="t" bIns="91425" lIns="91425" spcFirstLastPara="1" rIns="91425" wrap="square" tIns="91425">
-            <a:noAutofit/>
-          </a:bodyPr>
-          <a:lstStyle/>
-          <a:p>
-            <a:pPr indent="0" lvl="0" marL="0" rtl="0" algn="l">
-              <a:spcBef>
-                <a:spcPts val="0"/>
-              </a:spcBef>
-              <a:spcAft>
-                <a:spcPts val="0"/>
-              </a:spcAft>
-              <a:buNone/>
-            </a:pPr>
-            <a:r>
-              <a:t/>
-            </a:r>
-            <a:endParaRPr/>
-          </a:p>
-        </p:txBody>
-      </p:sp>
-    </p:spTree>
-  </p:cSld>
-  <p:clrMapOvr>
-    <a:masterClrMapping/>
-  </p:clrMapOvr>
-</p:notes>
-</file>
-
-<file path=ppt/notesSlides/notesSlide12.xml><?xml version="1.0" encoding="utf-8"?>
-<p:notes xmlns:a="http://schemas.openxmlformats.org/drawingml/2006/main" xmlns:r="http://schemas.openxmlformats.org/officeDocument/2006/relationships" xmlns:mc="http://schemas.openxmlformats.org/markup-compatibility/2006" xmlns:mv="urn:schemas-microsoft-com:mac:vml" xmlns:p="http://schemas.openxmlformats.org/presentationml/2006/main" xmlns:c="http://schemas.openxmlformats.org/drawingml/2006/chart" xmlns:dgm="http://schemas.openxmlformats.org/drawingml/2006/diagram" xmlns:o="urn:schemas-microsoft-com:office:office" xmlns:v="urn:schemas-microsoft-com:vml" xmlns:pvml="urn:schemas-microsoft-com:office:powerpoint" xmlns:com="http://schemas.openxmlformats.org/drawingml/2006/compatibility" xmlns:p14="http://schemas.microsoft.com/office/powerpoint/2010/main" xmlns:p15="http://schemas.microsoft.com/office/powerpoint/2012/main" showMasterPhAnim="0" showMasterSp="0">
-  <p:cSld>
-    <p:spTree>
-      <p:nvGrpSpPr>
-        <p:cNvPr id="180" name="Shape 180"/>
-        <p:cNvGrpSpPr/>
-        <p:nvPr/>
-      </p:nvGrpSpPr>
-      <p:grpSpPr>
-        <a:xfrm>
-          <a:off x="0" y="0"/>
-          <a:ext cx="0" cy="0"/>
-          <a:chOff x="0" y="0"/>
-          <a:chExt cx="0" cy="0"/>
-        </a:xfrm>
-      </p:grpSpPr>
-      <p:sp>
-        <p:nvSpPr>
-          <p:cNvPr id="181" name="Google Shape;181;g86054d7627_0_45:notes"/>
-          <p:cNvSpPr/>
-          <p:nvPr>
-            <p:ph idx="2" type="sldImg"/>
-          </p:nvPr>
-        </p:nvSpPr>
-        <p:spPr>
-          <a:xfrm>
-            <a:off x="381300" y="685800"/>
-            <a:ext cx="6096000" cy="3429000"/>
-          </a:xfrm>
-          <a:custGeom>
-            <a:rect b="b" l="l" r="r" t="t"/>
-            <a:pathLst>
-              <a:path extrusionOk="0" h="120000" w="120000">
-                <a:moveTo>
-                  <a:pt x="0" y="0"/>
-                </a:moveTo>
-                <a:lnTo>
-                  <a:pt x="120000" y="0"/>
-                </a:lnTo>
-                <a:lnTo>
-                  <a:pt x="120000" y="120000"/>
-                </a:lnTo>
-                <a:lnTo>
-                  <a:pt x="0" y="120000"/>
-                </a:lnTo>
-                <a:close/>
-              </a:path>
-            </a:pathLst>
-          </a:custGeom>
-        </p:spPr>
-      </p:sp>
-      <p:sp>
-        <p:nvSpPr>
-          <p:cNvPr id="182" name="Google Shape;182;g86054d7627_0_45:notes"/>
+          <p:cNvPr id="175" name="Google Shape;175;g86054d7627_0_45:notes"/>
           <p:cNvSpPr txBox="1"/>
           <p:nvPr>
             <p:ph idx="1" type="body"/>
@@ -1125,7 +1012,7 @@
       </p:grpSpPr>
       <p:sp>
         <p:nvSpPr>
-          <p:cNvPr id="117" name="Google Shape;117;g1f87997393_0_787:notes"/>
+          <p:cNvPr id="117" name="Google Shape;117;g87a67149c5_0_325:notes"/>
           <p:cNvSpPr/>
           <p:nvPr>
             <p:ph idx="2" type="sldImg"/>
@@ -1160,7 +1047,7 @@
       </p:sp>
       <p:sp>
         <p:nvSpPr>
-          <p:cNvPr id="118" name="Google Shape;118;g1f87997393_0_787:notes"/>
+          <p:cNvPr id="118" name="Google Shape;118;g87a67149c5_0_325:notes"/>
           <p:cNvSpPr txBox="1"/>
           <p:nvPr>
             <p:ph idx="1" type="body"/>
@@ -1210,7 +1097,7 @@
   <p:cSld>
     <p:spTree>
       <p:nvGrpSpPr>
-        <p:cNvPr id="123" name="Shape 123"/>
+        <p:cNvPr id="122" name="Shape 122"/>
         <p:cNvGrpSpPr/>
         <p:nvPr/>
       </p:nvGrpSpPr>
@@ -1224,7 +1111,7 @@
       </p:grpSpPr>
       <p:sp>
         <p:nvSpPr>
-          <p:cNvPr id="124" name="Google Shape;124;g87a67149c5_0_325:notes"/>
+          <p:cNvPr id="123" name="Google Shape;123;g86054d7627_0_0:notes"/>
           <p:cNvSpPr/>
           <p:nvPr>
             <p:ph idx="2" type="sldImg"/>
@@ -1259,7 +1146,7 @@
       </p:sp>
       <p:sp>
         <p:nvSpPr>
-          <p:cNvPr id="125" name="Google Shape;125;g87a67149c5_0_325:notes"/>
+          <p:cNvPr id="124" name="Google Shape;124;g86054d7627_0_0:notes"/>
           <p:cNvSpPr txBox="1"/>
           <p:nvPr>
             <p:ph idx="1" type="body"/>
@@ -1309,7 +1196,7 @@
   <p:cSld>
     <p:spTree>
       <p:nvGrpSpPr>
-        <p:cNvPr id="129" name="Shape 129"/>
+        <p:cNvPr id="128" name="Shape 128"/>
         <p:cNvGrpSpPr/>
         <p:nvPr/>
       </p:nvGrpSpPr>
@@ -1323,7 +1210,7 @@
       </p:grpSpPr>
       <p:sp>
         <p:nvSpPr>
-          <p:cNvPr id="130" name="Google Shape;130;g86054d7627_0_0:notes"/>
+          <p:cNvPr id="129" name="Google Shape;129;g86054d7627_0_18:notes"/>
           <p:cNvSpPr/>
           <p:nvPr>
             <p:ph idx="2" type="sldImg"/>
@@ -1358,7 +1245,7 @@
       </p:sp>
       <p:sp>
         <p:nvSpPr>
-          <p:cNvPr id="131" name="Google Shape;131;g86054d7627_0_0:notes"/>
+          <p:cNvPr id="130" name="Google Shape;130;g86054d7627_0_18:notes"/>
           <p:cNvSpPr txBox="1"/>
           <p:nvPr>
             <p:ph idx="1" type="body"/>
@@ -1408,7 +1295,7 @@
   <p:cSld>
     <p:spTree>
       <p:nvGrpSpPr>
-        <p:cNvPr id="135" name="Shape 135"/>
+        <p:cNvPr id="134" name="Shape 134"/>
         <p:cNvGrpSpPr/>
         <p:nvPr/>
       </p:nvGrpSpPr>
@@ -1422,7 +1309,7 @@
       </p:grpSpPr>
       <p:sp>
         <p:nvSpPr>
-          <p:cNvPr id="136" name="Google Shape;136;g86054d7627_0_18:notes"/>
+          <p:cNvPr id="135" name="Google Shape;135;g86054d7627_0_23:notes"/>
           <p:cNvSpPr/>
           <p:nvPr>
             <p:ph idx="2" type="sldImg"/>
@@ -1457,7 +1344,7 @@
       </p:sp>
       <p:sp>
         <p:nvSpPr>
-          <p:cNvPr id="137" name="Google Shape;137;g86054d7627_0_18:notes"/>
+          <p:cNvPr id="136" name="Google Shape;136;g86054d7627_0_23:notes"/>
           <p:cNvSpPr txBox="1"/>
           <p:nvPr>
             <p:ph idx="1" type="body"/>
@@ -1507,7 +1394,7 @@
   <p:cSld>
     <p:spTree>
       <p:nvGrpSpPr>
-        <p:cNvPr id="141" name="Shape 141"/>
+        <p:cNvPr id="140" name="Shape 140"/>
         <p:cNvGrpSpPr/>
         <p:nvPr/>
       </p:nvGrpSpPr>
@@ -1521,7 +1408,7 @@
       </p:grpSpPr>
       <p:sp>
         <p:nvSpPr>
-          <p:cNvPr id="142" name="Google Shape;142;g86054d7627_0_23:notes"/>
+          <p:cNvPr id="141" name="Google Shape;141;g86054d7627_0_28:notes"/>
           <p:cNvSpPr/>
           <p:nvPr>
             <p:ph idx="2" type="sldImg"/>
@@ -1556,7 +1443,7 @@
       </p:sp>
       <p:sp>
         <p:nvSpPr>
-          <p:cNvPr id="143" name="Google Shape;143;g86054d7627_0_23:notes"/>
+          <p:cNvPr id="142" name="Google Shape;142;g86054d7627_0_28:notes"/>
           <p:cNvSpPr txBox="1"/>
           <p:nvPr>
             <p:ph idx="1" type="body"/>
@@ -1606,7 +1493,7 @@
   <p:cSld>
     <p:spTree>
       <p:nvGrpSpPr>
-        <p:cNvPr id="147" name="Shape 147"/>
+        <p:cNvPr id="146" name="Shape 146"/>
         <p:cNvGrpSpPr/>
         <p:nvPr/>
       </p:nvGrpSpPr>
@@ -1620,7 +1507,7 @@
       </p:grpSpPr>
       <p:sp>
         <p:nvSpPr>
-          <p:cNvPr id="148" name="Google Shape;148;g86054d7627_0_28:notes"/>
+          <p:cNvPr id="147" name="Google Shape;147;g86054d7627_0_8:notes"/>
           <p:cNvSpPr/>
           <p:nvPr>
             <p:ph idx="2" type="sldImg"/>
@@ -1655,7 +1542,7 @@
       </p:sp>
       <p:sp>
         <p:nvSpPr>
-          <p:cNvPr id="149" name="Google Shape;149;g86054d7627_0_28:notes"/>
+          <p:cNvPr id="148" name="Google Shape;148;g86054d7627_0_8:notes"/>
           <p:cNvSpPr txBox="1"/>
           <p:nvPr>
             <p:ph idx="1" type="body"/>
@@ -1705,7 +1592,7 @@
   <p:cSld>
     <p:spTree>
       <p:nvGrpSpPr>
-        <p:cNvPr id="153" name="Shape 153"/>
+        <p:cNvPr id="152" name="Shape 152"/>
         <p:cNvGrpSpPr/>
         <p:nvPr/>
       </p:nvGrpSpPr>
@@ -1719,7 +1606,7 @@
       </p:grpSpPr>
       <p:sp>
         <p:nvSpPr>
-          <p:cNvPr id="154" name="Google Shape;154;g86054d7627_0_8:notes"/>
+          <p:cNvPr id="153" name="Google Shape;153;g86054d7627_0_33:notes"/>
           <p:cNvSpPr/>
           <p:nvPr>
             <p:ph idx="2" type="sldImg"/>
@@ -1754,7 +1641,7 @@
       </p:sp>
       <p:sp>
         <p:nvSpPr>
-          <p:cNvPr id="155" name="Google Shape;155;g86054d7627_0_8:notes"/>
+          <p:cNvPr id="154" name="Google Shape;154;g86054d7627_0_33:notes"/>
           <p:cNvSpPr txBox="1"/>
           <p:nvPr>
             <p:ph idx="1" type="body"/>
@@ -1804,7 +1691,7 @@
   <p:cSld>
     <p:spTree>
       <p:nvGrpSpPr>
-        <p:cNvPr id="159" name="Shape 159"/>
+        <p:cNvPr id="158" name="Shape 158"/>
         <p:cNvGrpSpPr/>
         <p:nvPr/>
       </p:nvGrpSpPr>
@@ -1818,7 +1705,7 @@
       </p:grpSpPr>
       <p:sp>
         <p:nvSpPr>
-          <p:cNvPr id="160" name="Google Shape;160;g86054d7627_0_33:notes"/>
+          <p:cNvPr id="159" name="Google Shape;159;g1f87997393_0_848:notes"/>
           <p:cNvSpPr/>
           <p:nvPr>
             <p:ph idx="2" type="sldImg"/>
@@ -1853,7 +1740,7 @@
       </p:sp>
       <p:sp>
         <p:nvSpPr>
-          <p:cNvPr id="161" name="Google Shape;161;g86054d7627_0_33:notes"/>
+          <p:cNvPr id="160" name="Google Shape;160;g1f87997393_0_848:notes"/>
           <p:cNvSpPr txBox="1"/>
           <p:nvPr>
             <p:ph idx="1" type="body"/>
@@ -4258,7 +4145,7 @@
       <p:sp>
         <p:nvSpPr>
           <p:cNvPr id="77" name="Google Shape;77;p14">
-            <a:hlinkClick action="ppaction://hlinksldjump" r:id="rId3"/>
+            <a:hlinkClick/>
           </p:cNvPr>
           <p:cNvSpPr/>
           <p:nvPr/>
@@ -4303,7 +4190,7 @@
       <p:sp>
         <p:nvSpPr>
           <p:cNvPr id="78" name="Google Shape;78;p14">
-            <a:hlinkClick action="ppaction://hlinksldjump" r:id="rId4"/>
+            <a:hlinkClick/>
           </p:cNvPr>
           <p:cNvSpPr/>
           <p:nvPr/>
@@ -4350,7 +4237,7 @@
       <p:sp>
         <p:nvSpPr>
           <p:cNvPr id="79" name="Google Shape;79;p14">
-            <a:hlinkClick action="ppaction://hlinksldjump" r:id="rId5"/>
+            <a:hlinkClick/>
           </p:cNvPr>
           <p:cNvSpPr/>
           <p:nvPr/>
@@ -4397,7 +4284,7 @@
       <p:sp>
         <p:nvSpPr>
           <p:cNvPr id="80" name="Google Shape;80;p14">
-            <a:hlinkClick action="ppaction://hlinksldjump" r:id="rId6"/>
+            <a:hlinkClick/>
           </p:cNvPr>
           <p:cNvSpPr/>
           <p:nvPr/>
@@ -4930,7 +4817,7 @@
       <p:sp>
         <p:nvSpPr>
           <p:cNvPr id="88" name="Google Shape;88;p15">
-            <a:hlinkClick action="ppaction://hlinksldjump" r:id="rId2"/>
+            <a:hlinkClick/>
           </p:cNvPr>
           <p:cNvSpPr/>
           <p:nvPr/>
@@ -4975,7 +4862,7 @@
       <p:sp>
         <p:nvSpPr>
           <p:cNvPr id="89" name="Google Shape;89;p15">
-            <a:hlinkClick action="ppaction://hlinksldjump" r:id="rId3"/>
+            <a:hlinkClick/>
           </p:cNvPr>
           <p:cNvSpPr/>
           <p:nvPr/>
@@ -5022,7 +4909,7 @@
       <p:sp>
         <p:nvSpPr>
           <p:cNvPr id="90" name="Google Shape;90;p15">
-            <a:hlinkClick action="ppaction://hlinksldjump" r:id="rId4"/>
+            <a:hlinkClick/>
           </p:cNvPr>
           <p:cNvSpPr/>
           <p:nvPr/>
@@ -5069,7 +4956,7 @@
       <p:sp>
         <p:nvSpPr>
           <p:cNvPr id="91" name="Google Shape;91;p15">
-            <a:hlinkClick action="ppaction://hlinksldjump" r:id="rId5"/>
+            <a:hlinkClick/>
           </p:cNvPr>
           <p:cNvSpPr/>
           <p:nvPr/>
@@ -5616,7 +5503,7 @@
       <p:sp>
         <p:nvSpPr>
           <p:cNvPr id="100" name="Google Shape;100;p16">
-            <a:hlinkClick action="ppaction://hlinksldjump" r:id="rId2"/>
+            <a:hlinkClick/>
           </p:cNvPr>
           <p:cNvSpPr/>
           <p:nvPr/>
@@ -5661,7 +5548,7 @@
       <p:sp>
         <p:nvSpPr>
           <p:cNvPr id="101" name="Google Shape;101;p16">
-            <a:hlinkClick action="ppaction://hlinksldjump" r:id="rId3"/>
+            <a:hlinkClick/>
           </p:cNvPr>
           <p:cNvSpPr/>
           <p:nvPr/>
@@ -5708,7 +5595,7 @@
       <p:sp>
         <p:nvSpPr>
           <p:cNvPr id="102" name="Google Shape;102;p16">
-            <a:hlinkClick action="ppaction://hlinksldjump" r:id="rId4"/>
+            <a:hlinkClick/>
           </p:cNvPr>
           <p:cNvSpPr/>
           <p:nvPr/>
@@ -5755,7 +5642,7 @@
       <p:sp>
         <p:nvSpPr>
           <p:cNvPr id="103" name="Google Shape;103;p16">
-            <a:hlinkClick action="ppaction://hlinksldjump" r:id="rId5"/>
+            <a:hlinkClick/>
           </p:cNvPr>
           <p:cNvSpPr/>
           <p:nvPr/>
@@ -10291,7 +10178,7 @@
   <p:cSld>
     <p:spTree>
       <p:nvGrpSpPr>
-        <p:cNvPr id="168" name="Shape 168"/>
+        <p:cNvPr id="170" name="Shape 170"/>
         <p:cNvGrpSpPr/>
         <p:nvPr/>
       </p:nvGrpSpPr>
@@ -10305,276 +10192,7 @@
       </p:grpSpPr>
       <p:sp>
         <p:nvSpPr>
-          <p:cNvPr id="169" name="Google Shape;169;p26"/>
-          <p:cNvSpPr txBox="1"/>
-          <p:nvPr>
-            <p:ph idx="1" type="body"/>
-          </p:nvPr>
-        </p:nvSpPr>
-        <p:spPr>
-          <a:xfrm>
-            <a:off x="1919225" y="1160050"/>
-            <a:ext cx="6803400" cy="469800"/>
-          </a:xfrm>
-          <a:prstGeom prst="rect">
-            <a:avLst/>
-          </a:prstGeom>
-          <a:ln>
-            <a:noFill/>
-          </a:ln>
-        </p:spPr>
-        <p:txBody>
-          <a:bodyPr anchorCtr="0" anchor="t" bIns="91425" lIns="91425" spcFirstLastPara="1" rIns="91425" wrap="square" tIns="91425">
-            <a:noAutofit/>
-          </a:bodyPr>
-          <a:lstStyle/>
-          <a:p>
-            <a:pPr indent="0" lvl="0" marL="0" rtl="0" algn="l">
-              <a:spcBef>
-                <a:spcPts val="0"/>
-              </a:spcBef>
-              <a:spcAft>
-                <a:spcPts val="1600"/>
-              </a:spcAft>
-              <a:buNone/>
-            </a:pPr>
-            <a:r>
-              <a:rPr lang="it">
-                <a:solidFill>
-                  <a:schemeClr val="lt2"/>
-                </a:solidFill>
-              </a:rPr>
-              <a:t>mongoDB</a:t>
-            </a:r>
-            <a:endParaRPr>
-              <a:solidFill>
-                <a:schemeClr val="lt2"/>
-              </a:solidFill>
-            </a:endParaRPr>
-          </a:p>
-        </p:txBody>
-      </p:sp>
-      <p:sp>
-        <p:nvSpPr>
-          <p:cNvPr id="170" name="Google Shape;170;p26"/>
-          <p:cNvSpPr txBox="1"/>
-          <p:nvPr>
-            <p:ph type="title"/>
-          </p:nvPr>
-        </p:nvSpPr>
-        <p:spPr>
-          <a:xfrm>
-            <a:off x="1297500" y="393750"/>
-            <a:ext cx="7038900" cy="914100"/>
-          </a:xfrm>
-          <a:prstGeom prst="rect">
-            <a:avLst/>
-          </a:prstGeom>
-        </p:spPr>
-        <p:txBody>
-          <a:bodyPr anchorCtr="0" anchor="t" bIns="91425" lIns="91425" spcFirstLastPara="1" rIns="91425" wrap="square" tIns="91425">
-            <a:noAutofit/>
-          </a:bodyPr>
-          <a:lstStyle/>
-          <a:p>
-            <a:pPr indent="0" lvl="0" marL="0" rtl="0" algn="l">
-              <a:spcBef>
-                <a:spcPts val="0"/>
-              </a:spcBef>
-              <a:spcAft>
-                <a:spcPts val="0"/>
-              </a:spcAft>
-              <a:buNone/>
-            </a:pPr>
-            <a:r>
-              <a:rPr lang="it"/>
-              <a:t>tecnologie e architettura</a:t>
-            </a:r>
-            <a:endParaRPr/>
-          </a:p>
-        </p:txBody>
-      </p:sp>
-      <p:sp>
-        <p:nvSpPr>
           <p:cNvPr id="171" name="Google Shape;171;p26"/>
-          <p:cNvSpPr txBox="1"/>
-          <p:nvPr>
-            <p:ph idx="1" type="body"/>
-          </p:nvPr>
-        </p:nvSpPr>
-        <p:spPr>
-          <a:xfrm>
-            <a:off x="2415725" y="1629850"/>
-            <a:ext cx="6803400" cy="469800"/>
-          </a:xfrm>
-          <a:prstGeom prst="rect">
-            <a:avLst/>
-          </a:prstGeom>
-          <a:ln>
-            <a:noFill/>
-          </a:ln>
-        </p:spPr>
-        <p:txBody>
-          <a:bodyPr anchorCtr="0" anchor="t" bIns="91425" lIns="91425" spcFirstLastPara="1" rIns="91425" wrap="square" tIns="91425">
-            <a:noAutofit/>
-          </a:bodyPr>
-          <a:lstStyle/>
-          <a:p>
-            <a:pPr indent="0" lvl="0" marL="0" rtl="0" algn="l">
-              <a:spcBef>
-                <a:spcPts val="0"/>
-              </a:spcBef>
-              <a:spcAft>
-                <a:spcPts val="1600"/>
-              </a:spcAft>
-              <a:buNone/>
-            </a:pPr>
-            <a:r>
-              <a:rPr lang="it">
-                <a:solidFill>
-                  <a:schemeClr val="lt2"/>
-                </a:solidFill>
-              </a:rPr>
-              <a:t>AWS - lambda, API gateway</a:t>
-            </a:r>
-            <a:endParaRPr>
-              <a:solidFill>
-                <a:schemeClr val="lt2"/>
-              </a:solidFill>
-            </a:endParaRPr>
-          </a:p>
-        </p:txBody>
-      </p:sp>
-      <p:sp>
-        <p:nvSpPr>
-          <p:cNvPr id="172" name="Google Shape;172;p26"/>
-          <p:cNvSpPr txBox="1"/>
-          <p:nvPr>
-            <p:ph idx="1" type="body"/>
-          </p:nvPr>
-        </p:nvSpPr>
-        <p:spPr>
-          <a:xfrm>
-            <a:off x="2793000" y="2099650"/>
-            <a:ext cx="6803400" cy="469800"/>
-          </a:xfrm>
-          <a:prstGeom prst="rect">
-            <a:avLst/>
-          </a:prstGeom>
-          <a:ln>
-            <a:noFill/>
-          </a:ln>
-        </p:spPr>
-        <p:txBody>
-          <a:bodyPr anchorCtr="0" anchor="t" bIns="91425" lIns="91425" spcFirstLastPara="1" rIns="91425" wrap="square" tIns="91425">
-            <a:noAutofit/>
-          </a:bodyPr>
-          <a:lstStyle/>
-          <a:p>
-            <a:pPr indent="0" lvl="0" marL="0" rtl="0" algn="l">
-              <a:spcBef>
-                <a:spcPts val="0"/>
-              </a:spcBef>
-              <a:spcAft>
-                <a:spcPts val="1600"/>
-              </a:spcAft>
-              <a:buNone/>
-            </a:pPr>
-            <a:r>
-              <a:rPr lang="it">
-                <a:solidFill>
-                  <a:schemeClr val="lt2"/>
-                </a:solidFill>
-              </a:rPr>
-              <a:t>GitHub repository</a:t>
-            </a:r>
-            <a:endParaRPr>
-              <a:solidFill>
-                <a:schemeClr val="lt2"/>
-              </a:solidFill>
-            </a:endParaRPr>
-          </a:p>
-        </p:txBody>
-      </p:sp>
-      <p:sp>
-        <p:nvSpPr>
-          <p:cNvPr id="173" name="Google Shape;173;p26"/>
-          <p:cNvSpPr txBox="1"/>
-          <p:nvPr>
-            <p:ph idx="1" type="body"/>
-          </p:nvPr>
-        </p:nvSpPr>
-        <p:spPr>
-          <a:xfrm>
-            <a:off x="3325700" y="2569450"/>
-            <a:ext cx="6803400" cy="469800"/>
-          </a:xfrm>
-          <a:prstGeom prst="rect">
-            <a:avLst/>
-          </a:prstGeom>
-          <a:ln>
-            <a:noFill/>
-          </a:ln>
-        </p:spPr>
-        <p:txBody>
-          <a:bodyPr anchorCtr="0" anchor="t" bIns="91425" lIns="91425" spcFirstLastPara="1" rIns="91425" wrap="square" tIns="91425">
-            <a:noAutofit/>
-          </a:bodyPr>
-          <a:lstStyle/>
-          <a:p>
-            <a:pPr indent="0" lvl="0" marL="0" rtl="0" algn="l">
-              <a:spcBef>
-                <a:spcPts val="0"/>
-              </a:spcBef>
-              <a:spcAft>
-                <a:spcPts val="1600"/>
-              </a:spcAft>
-              <a:buNone/>
-            </a:pPr>
-            <a:r>
-              <a:rPr lang="it">
-                <a:solidFill>
-                  <a:schemeClr val="lt2"/>
-                </a:solidFill>
-              </a:rPr>
-              <a:t>smartphone android/iOS</a:t>
-            </a:r>
-            <a:endParaRPr>
-              <a:solidFill>
-                <a:schemeClr val="lt2"/>
-              </a:solidFill>
-            </a:endParaRPr>
-          </a:p>
-        </p:txBody>
-      </p:sp>
-    </p:spTree>
-  </p:cSld>
-  <p:clrMapOvr>
-    <a:masterClrMapping/>
-  </p:clrMapOvr>
-</p:sld>
-</file>
-
-<file path=ppt/slides/slide11.xml><?xml version="1.0" encoding="utf-8"?>
-<p:sld xmlns:a="http://schemas.openxmlformats.org/drawingml/2006/main" xmlns:r="http://schemas.openxmlformats.org/officeDocument/2006/relationships" xmlns:mc="http://schemas.openxmlformats.org/markup-compatibility/2006" xmlns:mv="urn:schemas-microsoft-com:mac:vml" xmlns:p="http://schemas.openxmlformats.org/presentationml/2006/main" xmlns:c="http://schemas.openxmlformats.org/drawingml/2006/chart" xmlns:dgm="http://schemas.openxmlformats.org/drawingml/2006/diagram" xmlns:o="urn:schemas-microsoft-com:office:office" xmlns:v="urn:schemas-microsoft-com:vml" xmlns:pvml="urn:schemas-microsoft-com:office:powerpoint" xmlns:com="http://schemas.openxmlformats.org/drawingml/2006/compatibility" xmlns:p14="http://schemas.microsoft.com/office/powerpoint/2010/main" xmlns:p15="http://schemas.microsoft.com/office/powerpoint/2012/main">
-  <p:cSld>
-    <p:spTree>
-      <p:nvGrpSpPr>
-        <p:cNvPr id="177" name="Shape 177"/>
-        <p:cNvGrpSpPr/>
-        <p:nvPr/>
-      </p:nvGrpSpPr>
-      <p:grpSpPr>
-        <a:xfrm>
-          <a:off x="0" y="0"/>
-          <a:ext cx="0" cy="0"/>
-          <a:chOff x="0" y="0"/>
-          <a:chExt cx="0" cy="0"/>
-        </a:xfrm>
-      </p:grpSpPr>
-      <p:sp>
-        <p:nvSpPr>
-          <p:cNvPr id="178" name="Google Shape;178;p27"/>
           <p:cNvSpPr txBox="1"/>
           <p:nvPr>
             <p:ph idx="1" type="body"/>
@@ -10632,7 +10250,7 @@
       </p:sp>
       <p:sp>
         <p:nvSpPr>
-          <p:cNvPr id="179" name="Google Shape;179;p27"/>
+          <p:cNvPr id="172" name="Google Shape;172;p26"/>
           <p:cNvSpPr txBox="1"/>
           <p:nvPr>
             <p:ph type="title"/>
@@ -10678,12 +10296,12 @@
 </p:sld>
 </file>
 
-<file path=ppt/slides/slide12.xml><?xml version="1.0" encoding="utf-8"?>
+<file path=ppt/slides/slide11.xml><?xml version="1.0" encoding="utf-8"?>
 <p:sld xmlns:a="http://schemas.openxmlformats.org/drawingml/2006/main" xmlns:r="http://schemas.openxmlformats.org/officeDocument/2006/relationships" xmlns:mc="http://schemas.openxmlformats.org/markup-compatibility/2006" xmlns:mv="urn:schemas-microsoft-com:mac:vml" xmlns:p="http://schemas.openxmlformats.org/presentationml/2006/main" xmlns:c="http://schemas.openxmlformats.org/drawingml/2006/chart" xmlns:dgm="http://schemas.openxmlformats.org/drawingml/2006/diagram" xmlns:o="urn:schemas-microsoft-com:office:office" xmlns:v="urn:schemas-microsoft-com:vml" xmlns:pvml="urn:schemas-microsoft-com:office:powerpoint" xmlns:com="http://schemas.openxmlformats.org/drawingml/2006/compatibility" xmlns:p14="http://schemas.microsoft.com/office/powerpoint/2010/main" xmlns:p15="http://schemas.microsoft.com/office/powerpoint/2012/main">
   <p:cSld>
     <p:spTree>
       <p:nvGrpSpPr>
-        <p:cNvPr id="183" name="Shape 183"/>
+        <p:cNvPr id="176" name="Shape 176"/>
         <p:cNvGrpSpPr/>
         <p:nvPr/>
       </p:nvGrpSpPr>
@@ -10697,7 +10315,7 @@
       </p:grpSpPr>
       <p:sp>
         <p:nvSpPr>
-          <p:cNvPr id="184" name="Google Shape;184;p28"/>
+          <p:cNvPr id="177" name="Google Shape;177;p27"/>
           <p:cNvSpPr txBox="1"/>
           <p:nvPr>
             <p:ph idx="1" type="body"/>
@@ -10747,7 +10365,7 @@
             </a:pPr>
             <a:r>
               <a:rPr lang="it"/>
-              <a:t>aggiunta di classificazione del livello di difficoltà della lingua del video</a:t>
+              <a:t>aggiunta di classificazione del livello di difficoltà della lingua del video (facile, intermedio, difficile)</a:t>
             </a:r>
             <a:endParaRPr/>
           </a:p>
@@ -10764,7 +10382,7 @@
             </a:pPr>
             <a:r>
               <a:rPr lang="it"/>
-              <a:t>possibilità di “recensire” il video con il livello della lingua</a:t>
+              <a:t>possibilità per l’utente di assegnare il livello di difficoltà della lingua del talk</a:t>
             </a:r>
             <a:endParaRPr/>
           </a:p>
@@ -10823,7 +10441,7 @@
       </p:sp>
       <p:sp>
         <p:nvSpPr>
-          <p:cNvPr id="185" name="Google Shape;185;p28"/>
+          <p:cNvPr id="178" name="Google Shape;178;p27"/>
           <p:cNvSpPr txBox="1"/>
           <p:nvPr>
             <p:ph type="title"/>
@@ -10894,681 +10512,6 @@
         <p:nvSpPr>
           <p:cNvPr id="120" name="Google Shape;120;p18"/>
           <p:cNvSpPr txBox="1"/>
-          <p:nvPr/>
-        </p:nvSpPr>
-        <p:spPr>
-          <a:xfrm>
-            <a:off x="1297500" y="1132625"/>
-            <a:ext cx="7038900" cy="487200"/>
-          </a:xfrm>
-          <a:prstGeom prst="rect">
-            <a:avLst/>
-          </a:prstGeom>
-          <a:noFill/>
-          <a:ln>
-            <a:noFill/>
-          </a:ln>
-        </p:spPr>
-        <p:txBody>
-          <a:bodyPr anchorCtr="0" anchor="t" bIns="91425" lIns="91425" spcFirstLastPara="1" rIns="91425" wrap="square" tIns="91425">
-            <a:noAutofit/>
-          </a:bodyPr>
-          <a:lstStyle/>
-          <a:p>
-            <a:pPr indent="0" lvl="0" marL="0" rtl="0" algn="l">
-              <a:spcBef>
-                <a:spcPts val="0"/>
-              </a:spcBef>
-              <a:spcAft>
-                <a:spcPts val="0"/>
-              </a:spcAft>
-              <a:buNone/>
-            </a:pPr>
-            <a:r>
-              <a:rPr lang="it" sz="2400">
-                <a:solidFill>
-                  <a:srgbClr val="FFFFFF"/>
-                </a:solidFill>
-                <a:latin typeface="Montserrat"/>
-                <a:ea typeface="Montserrat"/>
-                <a:cs typeface="Montserrat"/>
-                <a:sym typeface="Montserrat"/>
-              </a:rPr>
-              <a:t>SOMMARIO</a:t>
-            </a:r>
-            <a:endParaRPr sz="2400">
-              <a:solidFill>
-                <a:srgbClr val="FFFFFF"/>
-              </a:solidFill>
-              <a:latin typeface="Montserrat"/>
-              <a:ea typeface="Montserrat"/>
-              <a:cs typeface="Montserrat"/>
-              <a:sym typeface="Montserrat"/>
-            </a:endParaRPr>
-          </a:p>
-        </p:txBody>
-      </p:sp>
-      <p:sp>
-        <p:nvSpPr>
-          <p:cNvPr id="121" name="Google Shape;121;p18"/>
-          <p:cNvSpPr txBox="1"/>
-          <p:nvPr/>
-        </p:nvSpPr>
-        <p:spPr>
-          <a:xfrm>
-            <a:off x="4443275" y="2064600"/>
-            <a:ext cx="3275400" cy="2020500"/>
-          </a:xfrm>
-          <a:prstGeom prst="rect">
-            <a:avLst/>
-          </a:prstGeom>
-          <a:noFill/>
-          <a:ln>
-            <a:noFill/>
-          </a:ln>
-        </p:spPr>
-        <p:txBody>
-          <a:bodyPr anchorCtr="0" anchor="t" bIns="91425" lIns="91425" spcFirstLastPara="1" rIns="91425" wrap="square" tIns="91425">
-            <a:noAutofit/>
-          </a:bodyPr>
-          <a:lstStyle/>
-          <a:p>
-            <a:pPr indent="0" lvl="0" marL="0" rtl="0" algn="l">
-              <a:spcBef>
-                <a:spcPts val="0"/>
-              </a:spcBef>
-              <a:spcAft>
-                <a:spcPts val="0"/>
-              </a:spcAft>
-              <a:buNone/>
-            </a:pPr>
-            <a:r>
-              <a:rPr lang="it">
-                <a:solidFill>
-                  <a:srgbClr val="FFFFFF"/>
-                </a:solidFill>
-                <a:uFill>
-                  <a:noFill/>
-                </a:uFill>
-                <a:latin typeface="Montserrat"/>
-                <a:ea typeface="Montserrat"/>
-                <a:cs typeface="Montserrat"/>
-                <a:sym typeface="Montserrat"/>
-                <a:hlinkClick/>
-              </a:rPr>
-              <a:t>Presentazione: Inserisci qui il testo</a:t>
-            </a:r>
-            <a:endParaRPr sz="1800">
-              <a:solidFill>
-                <a:srgbClr val="FFFFFF"/>
-              </a:solidFill>
-              <a:latin typeface="Average"/>
-              <a:ea typeface="Average"/>
-              <a:cs typeface="Average"/>
-              <a:sym typeface="Average"/>
-            </a:endParaRPr>
-          </a:p>
-          <a:p>
-            <a:pPr indent="0" lvl="0" marL="0" rtl="0" algn="l">
-              <a:lnSpc>
-                <a:spcPct val="150000"/>
-              </a:lnSpc>
-              <a:spcBef>
-                <a:spcPts val="900"/>
-              </a:spcBef>
-              <a:spcAft>
-                <a:spcPts val="0"/>
-              </a:spcAft>
-              <a:buNone/>
-            </a:pPr>
-            <a:r>
-              <a:rPr lang="it" sz="700">
-                <a:solidFill>
-                  <a:srgbClr val="FFFFFF"/>
-                </a:solidFill>
-                <a:uFill>
-                  <a:noFill/>
-                </a:uFill>
-                <a:latin typeface="Montserrat"/>
-                <a:ea typeface="Montserrat"/>
-                <a:cs typeface="Montserrat"/>
-                <a:sym typeface="Montserrat"/>
-                <a:hlinkClick/>
-              </a:rPr>
-              <a:t>Riflettori sui computer desktop</a:t>
-            </a:r>
-            <a:endParaRPr sz="700">
-              <a:solidFill>
-                <a:srgbClr val="FFFFFF"/>
-              </a:solidFill>
-              <a:latin typeface="Montserrat"/>
-              <a:ea typeface="Montserrat"/>
-              <a:cs typeface="Montserrat"/>
-              <a:sym typeface="Montserrat"/>
-            </a:endParaRPr>
-          </a:p>
-          <a:p>
-            <a:pPr indent="0" lvl="0" marL="0" rtl="0" algn="l">
-              <a:lnSpc>
-                <a:spcPct val="150000"/>
-              </a:lnSpc>
-              <a:spcBef>
-                <a:spcPts val="0"/>
-              </a:spcBef>
-              <a:spcAft>
-                <a:spcPts val="0"/>
-              </a:spcAft>
-              <a:buNone/>
-            </a:pPr>
-            <a:r>
-              <a:rPr lang="it" sz="700">
-                <a:solidFill>
-                  <a:srgbClr val="FFFFFF"/>
-                </a:solidFill>
-                <a:uFill>
-                  <a:noFill/>
-                </a:uFill>
-                <a:latin typeface="Montserrat"/>
-                <a:ea typeface="Montserrat"/>
-                <a:cs typeface="Montserrat"/>
-                <a:sym typeface="Montserrat"/>
-                <a:hlinkClick/>
-              </a:rPr>
-              <a:t>Riflettori sui dispositivi mobili</a:t>
-            </a:r>
-            <a:endParaRPr sz="700">
-              <a:solidFill>
-                <a:srgbClr val="FFFFFF"/>
-              </a:solidFill>
-              <a:latin typeface="Montserrat"/>
-              <a:ea typeface="Montserrat"/>
-              <a:cs typeface="Montserrat"/>
-              <a:sym typeface="Montserrat"/>
-            </a:endParaRPr>
-          </a:p>
-          <a:p>
-            <a:pPr indent="0" lvl="0" marL="0" rtl="0" algn="l">
-              <a:lnSpc>
-                <a:spcPct val="150000"/>
-              </a:lnSpc>
-              <a:spcBef>
-                <a:spcPts val="0"/>
-              </a:spcBef>
-              <a:spcAft>
-                <a:spcPts val="0"/>
-              </a:spcAft>
-              <a:buNone/>
-            </a:pPr>
-            <a:r>
-              <a:rPr lang="it" sz="700">
-                <a:solidFill>
-                  <a:srgbClr val="FFFFFF"/>
-                </a:solidFill>
-                <a:uFill>
-                  <a:noFill/>
-                </a:uFill>
-                <a:latin typeface="Montserrat"/>
-                <a:ea typeface="Montserrat"/>
-                <a:cs typeface="Montserrat"/>
-                <a:sym typeface="Montserrat"/>
-                <a:hlinkClick/>
-              </a:rPr>
-              <a:t>Riflettori sulla visualizzazione orizzontale nei dispositivi mobili</a:t>
-            </a:r>
-            <a:endParaRPr sz="700">
-              <a:solidFill>
-                <a:srgbClr val="FFFFFF"/>
-              </a:solidFill>
-              <a:latin typeface="Montserrat"/>
-              <a:ea typeface="Montserrat"/>
-              <a:cs typeface="Montserrat"/>
-              <a:sym typeface="Montserrat"/>
-            </a:endParaRPr>
-          </a:p>
-          <a:p>
-            <a:pPr indent="0" lvl="0" marL="0" rtl="0" algn="l">
-              <a:lnSpc>
-                <a:spcPct val="150000"/>
-              </a:lnSpc>
-              <a:spcBef>
-                <a:spcPts val="0"/>
-              </a:spcBef>
-              <a:spcAft>
-                <a:spcPts val="0"/>
-              </a:spcAft>
-              <a:buNone/>
-            </a:pPr>
-            <a:r>
-              <a:rPr lang="it" sz="700">
-                <a:solidFill>
-                  <a:srgbClr val="FFFFFF"/>
-                </a:solidFill>
-                <a:uFill>
-                  <a:noFill/>
-                </a:uFill>
-                <a:latin typeface="Montserrat"/>
-                <a:ea typeface="Montserrat"/>
-                <a:cs typeface="Montserrat"/>
-                <a:sym typeface="Montserrat"/>
-                <a:hlinkClick/>
-              </a:rPr>
-              <a:t>Riflettori sugli indossabili</a:t>
-            </a:r>
-            <a:endParaRPr sz="700">
-              <a:solidFill>
-                <a:srgbClr val="FFFFFF"/>
-              </a:solidFill>
-              <a:latin typeface="Montserrat"/>
-              <a:ea typeface="Montserrat"/>
-              <a:cs typeface="Montserrat"/>
-              <a:sym typeface="Montserrat"/>
-            </a:endParaRPr>
-          </a:p>
-          <a:p>
-            <a:pPr indent="0" lvl="0" marL="0" rtl="0" algn="l">
-              <a:lnSpc>
-                <a:spcPct val="150000"/>
-              </a:lnSpc>
-              <a:spcBef>
-                <a:spcPts val="0"/>
-              </a:spcBef>
-              <a:spcAft>
-                <a:spcPts val="0"/>
-              </a:spcAft>
-              <a:buNone/>
-            </a:pPr>
-            <a:r>
-              <a:rPr lang="it" sz="700">
-                <a:solidFill>
-                  <a:srgbClr val="FFFFFF"/>
-                </a:solidFill>
-                <a:uFill>
-                  <a:noFill/>
-                </a:uFill>
-                <a:latin typeface="Montserrat"/>
-                <a:ea typeface="Montserrat"/>
-                <a:cs typeface="Montserrat"/>
-                <a:sym typeface="Montserrat"/>
-                <a:hlinkClick/>
-              </a:rPr>
-              <a:t>Riflettori sui tablet</a:t>
-            </a:r>
-            <a:endParaRPr sz="700">
-              <a:solidFill>
-                <a:srgbClr val="FFFFFF"/>
-              </a:solidFill>
-              <a:latin typeface="Montserrat"/>
-              <a:ea typeface="Montserrat"/>
-              <a:cs typeface="Montserrat"/>
-              <a:sym typeface="Montserrat"/>
-            </a:endParaRPr>
-          </a:p>
-          <a:p>
-            <a:pPr indent="0" lvl="0" marL="0" rtl="0" algn="l">
-              <a:lnSpc>
-                <a:spcPct val="150000"/>
-              </a:lnSpc>
-              <a:spcBef>
-                <a:spcPts val="0"/>
-              </a:spcBef>
-              <a:spcAft>
-                <a:spcPts val="0"/>
-              </a:spcAft>
-              <a:buNone/>
-            </a:pPr>
-            <a:r>
-              <a:rPr lang="it" sz="700">
-                <a:solidFill>
-                  <a:srgbClr val="FFFFFF"/>
-                </a:solidFill>
-                <a:uFill>
-                  <a:noFill/>
-                </a:uFill>
-                <a:latin typeface="Montserrat"/>
-                <a:ea typeface="Montserrat"/>
-                <a:cs typeface="Montserrat"/>
-                <a:sym typeface="Montserrat"/>
-                <a:hlinkClick/>
-              </a:rPr>
-              <a:t>Riflettori sulla visualizzazione orizzontale nei tablet</a:t>
-            </a:r>
-            <a:endParaRPr sz="700">
-              <a:solidFill>
-                <a:srgbClr val="FFFFFF"/>
-              </a:solidFill>
-              <a:latin typeface="Montserrat"/>
-              <a:ea typeface="Montserrat"/>
-              <a:cs typeface="Montserrat"/>
-              <a:sym typeface="Montserrat"/>
-            </a:endParaRPr>
-          </a:p>
-          <a:p>
-            <a:pPr indent="0" lvl="0" marL="0" rtl="0" algn="l">
-              <a:lnSpc>
-                <a:spcPct val="150000"/>
-              </a:lnSpc>
-              <a:spcBef>
-                <a:spcPts val="0"/>
-              </a:spcBef>
-              <a:spcAft>
-                <a:spcPts val="0"/>
-              </a:spcAft>
-              <a:buNone/>
-            </a:pPr>
-            <a:r>
-              <a:rPr lang="it" sz="700">
-                <a:solidFill>
-                  <a:srgbClr val="FFFFFF"/>
-                </a:solidFill>
-                <a:uFill>
-                  <a:noFill/>
-                </a:uFill>
-                <a:latin typeface="Montserrat"/>
-                <a:ea typeface="Montserrat"/>
-                <a:cs typeface="Montserrat"/>
-                <a:sym typeface="Montserrat"/>
-                <a:hlinkClick/>
-              </a:rPr>
-              <a:t>Riflettori sugli indossabili</a:t>
-            </a:r>
-            <a:endParaRPr sz="1800">
-              <a:solidFill>
-                <a:srgbClr val="FFFFFF"/>
-              </a:solidFill>
-              <a:latin typeface="Average"/>
-              <a:ea typeface="Average"/>
-              <a:cs typeface="Average"/>
-              <a:sym typeface="Average"/>
-            </a:endParaRPr>
-          </a:p>
-          <a:p>
-            <a:pPr indent="0" lvl="0" marL="0" rtl="0" algn="l">
-              <a:spcBef>
-                <a:spcPts val="1300"/>
-              </a:spcBef>
-              <a:spcAft>
-                <a:spcPts val="0"/>
-              </a:spcAft>
-              <a:buNone/>
-            </a:pPr>
-            <a:r>
-              <a:rPr lang="it">
-                <a:solidFill>
-                  <a:srgbClr val="FFFFFF"/>
-                </a:solidFill>
-                <a:uFill>
-                  <a:noFill/>
-                </a:uFill>
-                <a:latin typeface="Montserrat"/>
-                <a:ea typeface="Montserrat"/>
-                <a:cs typeface="Montserrat"/>
-                <a:sym typeface="Montserrat"/>
-                <a:hlinkClick/>
-              </a:rPr>
-              <a:t>Tempistica del progetto</a:t>
-            </a:r>
-            <a:endParaRPr sz="1800">
-              <a:solidFill>
-                <a:srgbClr val="FFFFFF"/>
-              </a:solidFill>
-              <a:latin typeface="Average"/>
-              <a:ea typeface="Average"/>
-              <a:cs typeface="Average"/>
-              <a:sym typeface="Average"/>
-            </a:endParaRPr>
-          </a:p>
-        </p:txBody>
-      </p:sp>
-      <p:sp>
-        <p:nvSpPr>
-          <p:cNvPr id="122" name="Google Shape;122;p18"/>
-          <p:cNvSpPr txBox="1"/>
-          <p:nvPr/>
-        </p:nvSpPr>
-        <p:spPr>
-          <a:xfrm>
-            <a:off x="1294300" y="2064601"/>
-            <a:ext cx="3018300" cy="2020500"/>
-          </a:xfrm>
-          <a:prstGeom prst="rect">
-            <a:avLst/>
-          </a:prstGeom>
-          <a:noFill/>
-          <a:ln>
-            <a:noFill/>
-          </a:ln>
-        </p:spPr>
-        <p:txBody>
-          <a:bodyPr anchorCtr="0" anchor="t" bIns="91425" lIns="91425" spcFirstLastPara="1" rIns="91425" wrap="square" tIns="91425">
-            <a:noAutofit/>
-          </a:bodyPr>
-          <a:lstStyle/>
-          <a:p>
-            <a:pPr indent="0" lvl="0" marL="0" rtl="0" algn="l">
-              <a:lnSpc>
-                <a:spcPct val="100000"/>
-              </a:lnSpc>
-              <a:spcBef>
-                <a:spcPts val="0"/>
-              </a:spcBef>
-              <a:spcAft>
-                <a:spcPts val="0"/>
-              </a:spcAft>
-              <a:buNone/>
-            </a:pPr>
-            <a:r>
-              <a:rPr lang="it">
-                <a:solidFill>
-                  <a:srgbClr val="FFFFFF"/>
-                </a:solidFill>
-                <a:uFill>
-                  <a:noFill/>
-                </a:uFill>
-                <a:latin typeface="Montserrat"/>
-                <a:ea typeface="Montserrat"/>
-                <a:cs typeface="Montserrat"/>
-                <a:sym typeface="Montserrat"/>
-                <a:hlinkClick action="ppaction://hlinksldjump" r:id="rId3"/>
-              </a:rPr>
-              <a:t>Panoramica</a:t>
-            </a:r>
-            <a:endParaRPr sz="1800">
-              <a:solidFill>
-                <a:srgbClr val="FFFFFF"/>
-              </a:solidFill>
-              <a:latin typeface="Average"/>
-              <a:ea typeface="Average"/>
-              <a:cs typeface="Average"/>
-              <a:sym typeface="Average"/>
-            </a:endParaRPr>
-          </a:p>
-          <a:p>
-            <a:pPr indent="0" lvl="0" marL="0" rtl="0" algn="l">
-              <a:lnSpc>
-                <a:spcPct val="100000"/>
-              </a:lnSpc>
-              <a:spcBef>
-                <a:spcPts val="900"/>
-              </a:spcBef>
-              <a:spcAft>
-                <a:spcPts val="0"/>
-              </a:spcAft>
-              <a:buNone/>
-            </a:pPr>
-            <a:r>
-              <a:rPr lang="it">
-                <a:solidFill>
-                  <a:srgbClr val="FFFFFF"/>
-                </a:solidFill>
-                <a:uFill>
-                  <a:noFill/>
-                </a:uFill>
-                <a:latin typeface="Montserrat"/>
-                <a:ea typeface="Montserrat"/>
-                <a:cs typeface="Montserrat"/>
-                <a:sym typeface="Montserrat"/>
-                <a:hlinkClick action="ppaction://hlinksldjump" r:id="rId4"/>
-              </a:rPr>
-              <a:t>Obiettivo del progetto</a:t>
-            </a:r>
-            <a:endParaRPr sz="1800">
-              <a:solidFill>
-                <a:srgbClr val="FFFFFF"/>
-              </a:solidFill>
-              <a:latin typeface="Average"/>
-              <a:ea typeface="Average"/>
-              <a:cs typeface="Average"/>
-              <a:sym typeface="Average"/>
-            </a:endParaRPr>
-          </a:p>
-          <a:p>
-            <a:pPr indent="0" lvl="0" marL="0" rtl="0" algn="l">
-              <a:lnSpc>
-                <a:spcPct val="100000"/>
-              </a:lnSpc>
-              <a:spcBef>
-                <a:spcPts val="900"/>
-              </a:spcBef>
-              <a:spcAft>
-                <a:spcPts val="0"/>
-              </a:spcAft>
-              <a:buNone/>
-            </a:pPr>
-            <a:r>
-              <a:rPr lang="it">
-                <a:solidFill>
-                  <a:srgbClr val="FFFFFF"/>
-                </a:solidFill>
-                <a:uFill>
-                  <a:noFill/>
-                </a:uFill>
-                <a:latin typeface="Montserrat"/>
-                <a:ea typeface="Montserrat"/>
-                <a:cs typeface="Montserrat"/>
-                <a:sym typeface="Montserrat"/>
-                <a:hlinkClick/>
-              </a:rPr>
-              <a:t>Pubblico target</a:t>
-            </a:r>
-            <a:endParaRPr sz="1800">
-              <a:solidFill>
-                <a:srgbClr val="FFFFFF"/>
-              </a:solidFill>
-              <a:latin typeface="Average"/>
-              <a:ea typeface="Average"/>
-              <a:cs typeface="Average"/>
-              <a:sym typeface="Average"/>
-            </a:endParaRPr>
-          </a:p>
-          <a:p>
-            <a:pPr indent="0" lvl="0" marL="0" rtl="0" algn="l">
-              <a:lnSpc>
-                <a:spcPct val="100000"/>
-              </a:lnSpc>
-              <a:spcBef>
-                <a:spcPts val="900"/>
-              </a:spcBef>
-              <a:spcAft>
-                <a:spcPts val="0"/>
-              </a:spcAft>
-              <a:buNone/>
-            </a:pPr>
-            <a:r>
-              <a:rPr lang="it">
-                <a:solidFill>
-                  <a:srgbClr val="FFFFFF"/>
-                </a:solidFill>
-                <a:uFill>
-                  <a:noFill/>
-                </a:uFill>
-                <a:latin typeface="Montserrat"/>
-                <a:ea typeface="Montserrat"/>
-                <a:cs typeface="Montserrat"/>
-                <a:sym typeface="Montserrat"/>
-                <a:hlinkClick/>
-              </a:rPr>
-              <a:t>Tendenze di mercato</a:t>
-            </a:r>
-            <a:endParaRPr sz="1800">
-              <a:solidFill>
-                <a:srgbClr val="FFFFFF"/>
-              </a:solidFill>
-              <a:latin typeface="Average"/>
-              <a:ea typeface="Average"/>
-              <a:cs typeface="Average"/>
-              <a:sym typeface="Average"/>
-            </a:endParaRPr>
-          </a:p>
-          <a:p>
-            <a:pPr indent="0" lvl="0" marL="0" rtl="0" algn="l">
-              <a:lnSpc>
-                <a:spcPct val="100000"/>
-              </a:lnSpc>
-              <a:spcBef>
-                <a:spcPts val="900"/>
-              </a:spcBef>
-              <a:spcAft>
-                <a:spcPts val="900"/>
-              </a:spcAft>
-              <a:buNone/>
-            </a:pPr>
-            <a:r>
-              <a:rPr lang="it">
-                <a:solidFill>
-                  <a:srgbClr val="FFFFFF"/>
-                </a:solidFill>
-                <a:uFill>
-                  <a:noFill/>
-                </a:uFill>
-                <a:latin typeface="Montserrat"/>
-                <a:ea typeface="Montserrat"/>
-                <a:cs typeface="Montserrat"/>
-                <a:sym typeface="Montserrat"/>
-                <a:hlinkClick/>
-              </a:rPr>
-              <a:t>Diagramma del ciclo</a:t>
-            </a:r>
-            <a:endParaRPr sz="1800">
-              <a:solidFill>
-                <a:srgbClr val="FFFFFF"/>
-              </a:solidFill>
-              <a:latin typeface="Average"/>
-              <a:ea typeface="Average"/>
-              <a:cs typeface="Average"/>
-              <a:sym typeface="Average"/>
-            </a:endParaRPr>
-          </a:p>
-        </p:txBody>
-      </p:sp>
-    </p:spTree>
-  </p:cSld>
-  <p:clrMapOvr>
-    <a:masterClrMapping/>
-  </p:clrMapOvr>
-</p:sld>
-</file>
-
-<file path=ppt/slides/slide3.xml><?xml version="1.0" encoding="utf-8"?>
-<p:sld xmlns:a="http://schemas.openxmlformats.org/drawingml/2006/main" xmlns:r="http://schemas.openxmlformats.org/officeDocument/2006/relationships" xmlns:mc="http://schemas.openxmlformats.org/markup-compatibility/2006" xmlns:mv="urn:schemas-microsoft-com:mac:vml" xmlns:p="http://schemas.openxmlformats.org/presentationml/2006/main" xmlns:c="http://schemas.openxmlformats.org/drawingml/2006/chart" xmlns:dgm="http://schemas.openxmlformats.org/drawingml/2006/diagram" xmlns:o="urn:schemas-microsoft-com:office:office" xmlns:v="urn:schemas-microsoft-com:vml" xmlns:pvml="urn:schemas-microsoft-com:office:powerpoint" xmlns:com="http://schemas.openxmlformats.org/drawingml/2006/compatibility" xmlns:p14="http://schemas.microsoft.com/office/powerpoint/2010/main" xmlns:p15="http://schemas.microsoft.com/office/powerpoint/2012/main">
-  <p:cSld>
-    <p:spTree>
-      <p:nvGrpSpPr>
-        <p:cNvPr id="126" name="Shape 126"/>
-        <p:cNvGrpSpPr/>
-        <p:nvPr/>
-      </p:nvGrpSpPr>
-      <p:grpSpPr>
-        <a:xfrm>
-          <a:off x="0" y="0"/>
-          <a:ext cx="0" cy="0"/>
-          <a:chOff x="0" y="0"/>
-          <a:chExt cx="0" cy="0"/>
-        </a:xfrm>
-      </p:grpSpPr>
-      <p:sp>
-        <p:nvSpPr>
-          <p:cNvPr id="127" name="Google Shape;127;p19"/>
-          <p:cNvSpPr txBox="1"/>
           <p:nvPr>
             <p:ph idx="1" type="body"/>
           </p:nvPr>
@@ -11752,7 +10695,7 @@
       </p:sp>
       <p:sp>
         <p:nvSpPr>
-          <p:cNvPr id="128" name="Google Shape;128;p19"/>
+          <p:cNvPr id="121" name="Google Shape;121;p18"/>
           <p:cNvSpPr txBox="1"/>
           <p:nvPr>
             <p:ph type="title"/>
@@ -11798,12 +10741,12 @@
 </p:sld>
 </file>
 
-<file path=ppt/slides/slide4.xml><?xml version="1.0" encoding="utf-8"?>
+<file path=ppt/slides/slide3.xml><?xml version="1.0" encoding="utf-8"?>
 <p:sld xmlns:a="http://schemas.openxmlformats.org/drawingml/2006/main" xmlns:r="http://schemas.openxmlformats.org/officeDocument/2006/relationships" xmlns:mc="http://schemas.openxmlformats.org/markup-compatibility/2006" xmlns:mv="urn:schemas-microsoft-com:mac:vml" xmlns:p="http://schemas.openxmlformats.org/presentationml/2006/main" xmlns:c="http://schemas.openxmlformats.org/drawingml/2006/chart" xmlns:dgm="http://schemas.openxmlformats.org/drawingml/2006/diagram" xmlns:o="urn:schemas-microsoft-com:office:office" xmlns:v="urn:schemas-microsoft-com:vml" xmlns:pvml="urn:schemas-microsoft-com:office:powerpoint" xmlns:com="http://schemas.openxmlformats.org/drawingml/2006/compatibility" xmlns:p14="http://schemas.microsoft.com/office/powerpoint/2010/main" xmlns:p15="http://schemas.microsoft.com/office/powerpoint/2012/main">
   <p:cSld>
     <p:spTree>
       <p:nvGrpSpPr>
-        <p:cNvPr id="132" name="Shape 132"/>
+        <p:cNvPr id="125" name="Shape 125"/>
         <p:cNvGrpSpPr/>
         <p:nvPr/>
       </p:nvGrpSpPr>
@@ -11817,7 +10760,7 @@
       </p:grpSpPr>
       <p:sp>
         <p:nvSpPr>
-          <p:cNvPr id="133" name="Google Shape;133;p20"/>
+          <p:cNvPr id="126" name="Google Shape;126;p19"/>
           <p:cNvSpPr txBox="1"/>
           <p:nvPr>
             <p:ph idx="1" type="body"/>
@@ -11913,7 +10856,7 @@
       </p:sp>
       <p:sp>
         <p:nvSpPr>
-          <p:cNvPr id="134" name="Google Shape;134;p20"/>
+          <p:cNvPr id="127" name="Google Shape;127;p19"/>
           <p:cNvSpPr txBox="1"/>
           <p:nvPr>
             <p:ph type="title"/>
@@ -11959,12 +10902,12 @@
 </p:sld>
 </file>
 
-<file path=ppt/slides/slide5.xml><?xml version="1.0" encoding="utf-8"?>
+<file path=ppt/slides/slide4.xml><?xml version="1.0" encoding="utf-8"?>
 <p:sld xmlns:a="http://schemas.openxmlformats.org/drawingml/2006/main" xmlns:r="http://schemas.openxmlformats.org/officeDocument/2006/relationships" xmlns:mc="http://schemas.openxmlformats.org/markup-compatibility/2006" xmlns:mv="urn:schemas-microsoft-com:mac:vml" xmlns:p="http://schemas.openxmlformats.org/presentationml/2006/main" xmlns:c="http://schemas.openxmlformats.org/drawingml/2006/chart" xmlns:dgm="http://schemas.openxmlformats.org/drawingml/2006/diagram" xmlns:o="urn:schemas-microsoft-com:office:office" xmlns:v="urn:schemas-microsoft-com:vml" xmlns:pvml="urn:schemas-microsoft-com:office:powerpoint" xmlns:com="http://schemas.openxmlformats.org/drawingml/2006/compatibility" xmlns:p14="http://schemas.microsoft.com/office/powerpoint/2010/main" xmlns:p15="http://schemas.microsoft.com/office/powerpoint/2012/main">
   <p:cSld>
     <p:spTree>
       <p:nvGrpSpPr>
-        <p:cNvPr id="138" name="Shape 138"/>
+        <p:cNvPr id="131" name="Shape 131"/>
         <p:cNvGrpSpPr/>
         <p:nvPr/>
       </p:nvGrpSpPr>
@@ -11978,7 +10921,7 @@
       </p:grpSpPr>
       <p:sp>
         <p:nvSpPr>
-          <p:cNvPr id="139" name="Google Shape;139;p21"/>
+          <p:cNvPr id="132" name="Google Shape;132;p20"/>
           <p:cNvSpPr txBox="1"/>
           <p:nvPr>
             <p:ph idx="1" type="body"/>
@@ -12058,7 +11001,7 @@
       </p:sp>
       <p:sp>
         <p:nvSpPr>
-          <p:cNvPr id="140" name="Google Shape;140;p21"/>
+          <p:cNvPr id="133" name="Google Shape;133;p20"/>
           <p:cNvSpPr txBox="1"/>
           <p:nvPr>
             <p:ph type="title"/>
@@ -12104,12 +11047,12 @@
 </p:sld>
 </file>
 
-<file path=ppt/slides/slide6.xml><?xml version="1.0" encoding="utf-8"?>
+<file path=ppt/slides/slide5.xml><?xml version="1.0" encoding="utf-8"?>
 <p:sld xmlns:a="http://schemas.openxmlformats.org/drawingml/2006/main" xmlns:r="http://schemas.openxmlformats.org/officeDocument/2006/relationships" xmlns:mc="http://schemas.openxmlformats.org/markup-compatibility/2006" xmlns:mv="urn:schemas-microsoft-com:mac:vml" xmlns:p="http://schemas.openxmlformats.org/presentationml/2006/main" xmlns:c="http://schemas.openxmlformats.org/drawingml/2006/chart" xmlns:dgm="http://schemas.openxmlformats.org/drawingml/2006/diagram" xmlns:o="urn:schemas-microsoft-com:office:office" xmlns:v="urn:schemas-microsoft-com:vml" xmlns:pvml="urn:schemas-microsoft-com:office:powerpoint" xmlns:com="http://schemas.openxmlformats.org/drawingml/2006/compatibility" xmlns:p14="http://schemas.microsoft.com/office/powerpoint/2010/main" xmlns:p15="http://schemas.microsoft.com/office/powerpoint/2012/main">
   <p:cSld>
     <p:spTree>
       <p:nvGrpSpPr>
-        <p:cNvPr id="144" name="Shape 144"/>
+        <p:cNvPr id="137" name="Shape 137"/>
         <p:cNvGrpSpPr/>
         <p:nvPr/>
       </p:nvGrpSpPr>
@@ -12123,7 +11066,7 @@
       </p:grpSpPr>
       <p:sp>
         <p:nvSpPr>
-          <p:cNvPr id="145" name="Google Shape;145;p22"/>
+          <p:cNvPr id="138" name="Google Shape;138;p21"/>
           <p:cNvSpPr txBox="1"/>
           <p:nvPr>
             <p:ph idx="1" type="body"/>
@@ -12175,7 +11118,7 @@
             </a:r>
             <a:r>
               <a:rPr lang="it"/>
-              <a:t>], ma è ancora alle prime armi in questa lingua</a:t>
+              <a:t>], ma è ancora alle prime armi nello studio di questa lingua.</a:t>
             </a:r>
             <a:endParaRPr/>
           </a:p>
@@ -12219,7 +11162,7 @@
             </a:r>
             <a:r>
               <a:rPr lang="it"/>
-              <a:t>] e i sottotitoli nella sua lingua madre. Perfetti per muovere i primi passi ed iniziare a “farsi l’orecchio”</a:t>
+              <a:t>] e i sottotitoli nella sua lingua madre. Perfetti per muovere i primi passi ed iniziare a “farsi l’orecchio”.</a:t>
             </a:r>
             <a:endParaRPr/>
           </a:p>
@@ -12227,7 +11170,7 @@
       </p:sp>
       <p:sp>
         <p:nvSpPr>
-          <p:cNvPr id="146" name="Google Shape;146;p22"/>
+          <p:cNvPr id="139" name="Google Shape;139;p21"/>
           <p:cNvSpPr txBox="1"/>
           <p:nvPr>
             <p:ph type="title"/>
@@ -12273,12 +11216,12 @@
 </p:sld>
 </file>
 
-<file path=ppt/slides/slide7.xml><?xml version="1.0" encoding="utf-8"?>
+<file path=ppt/slides/slide6.xml><?xml version="1.0" encoding="utf-8"?>
 <p:sld xmlns:a="http://schemas.openxmlformats.org/drawingml/2006/main" xmlns:r="http://schemas.openxmlformats.org/officeDocument/2006/relationships" xmlns:mc="http://schemas.openxmlformats.org/markup-compatibility/2006" xmlns:mv="urn:schemas-microsoft-com:mac:vml" xmlns:p="http://schemas.openxmlformats.org/presentationml/2006/main" xmlns:c="http://schemas.openxmlformats.org/drawingml/2006/chart" xmlns:dgm="http://schemas.openxmlformats.org/drawingml/2006/diagram" xmlns:o="urn:schemas-microsoft-com:office:office" xmlns:v="urn:schemas-microsoft-com:vml" xmlns:pvml="urn:schemas-microsoft-com:office:powerpoint" xmlns:com="http://schemas.openxmlformats.org/drawingml/2006/compatibility" xmlns:p14="http://schemas.microsoft.com/office/powerpoint/2010/main" xmlns:p15="http://schemas.microsoft.com/office/powerpoint/2012/main">
   <p:cSld>
     <p:spTree>
       <p:nvGrpSpPr>
-        <p:cNvPr id="150" name="Shape 150"/>
+        <p:cNvPr id="143" name="Shape 143"/>
         <p:cNvGrpSpPr/>
         <p:nvPr/>
       </p:nvGrpSpPr>
@@ -12292,7 +11235,7 @@
       </p:grpSpPr>
       <p:sp>
         <p:nvSpPr>
-          <p:cNvPr id="151" name="Google Shape;151;p23"/>
+          <p:cNvPr id="144" name="Google Shape;144;p22"/>
           <p:cNvSpPr txBox="1"/>
           <p:nvPr>
             <p:ph idx="1" type="body"/>
@@ -12332,7 +11275,7 @@
             </a:r>
             <a:r>
               <a:rPr lang="it"/>
-              <a:t>] intermedio vuole perfezionare il [</a:t>
+              <a:t>] con un livello intermedio vuole perfezionare il [</a:t>
             </a:r>
             <a:r>
               <a:rPr b="1" lang="it"/>
@@ -12384,7 +11327,7 @@
       </p:sp>
       <p:sp>
         <p:nvSpPr>
-          <p:cNvPr id="152" name="Google Shape;152;p23"/>
+          <p:cNvPr id="145" name="Google Shape;145;p22"/>
           <p:cNvSpPr txBox="1"/>
           <p:nvPr>
             <p:ph type="title"/>
@@ -12430,12 +11373,12 @@
 </p:sld>
 </file>
 
-<file path=ppt/slides/slide8.xml><?xml version="1.0" encoding="utf-8"?>
+<file path=ppt/slides/slide7.xml><?xml version="1.0" encoding="utf-8"?>
 <p:sld xmlns:a="http://schemas.openxmlformats.org/drawingml/2006/main" xmlns:r="http://schemas.openxmlformats.org/officeDocument/2006/relationships" xmlns:mc="http://schemas.openxmlformats.org/markup-compatibility/2006" xmlns:mv="urn:schemas-microsoft-com:mac:vml" xmlns:p="http://schemas.openxmlformats.org/presentationml/2006/main" xmlns:c="http://schemas.openxmlformats.org/drawingml/2006/chart" xmlns:dgm="http://schemas.openxmlformats.org/drawingml/2006/diagram" xmlns:o="urn:schemas-microsoft-com:office:office" xmlns:v="urn:schemas-microsoft-com:vml" xmlns:pvml="urn:schemas-microsoft-com:office:powerpoint" xmlns:com="http://schemas.openxmlformats.org/drawingml/2006/compatibility" xmlns:p14="http://schemas.microsoft.com/office/powerpoint/2010/main" xmlns:p15="http://schemas.microsoft.com/office/powerpoint/2012/main">
   <p:cSld>
     <p:spTree>
       <p:nvGrpSpPr>
-        <p:cNvPr id="156" name="Shape 156"/>
+        <p:cNvPr id="149" name="Shape 149"/>
         <p:cNvGrpSpPr/>
         <p:nvPr/>
       </p:nvGrpSpPr>
@@ -12449,7 +11392,7 @@
       </p:grpSpPr>
       <p:sp>
         <p:nvSpPr>
-          <p:cNvPr id="157" name="Google Shape;157;p24"/>
+          <p:cNvPr id="150" name="Google Shape;150;p23"/>
           <p:cNvSpPr txBox="1"/>
           <p:nvPr>
             <p:ph idx="1" type="body"/>
@@ -12548,7 +11491,7 @@
       </p:sp>
       <p:sp>
         <p:nvSpPr>
-          <p:cNvPr id="158" name="Google Shape;158;p24"/>
+          <p:cNvPr id="151" name="Google Shape;151;p23"/>
           <p:cNvSpPr txBox="1"/>
           <p:nvPr>
             <p:ph type="title"/>
@@ -12594,12 +11537,12 @@
 </p:sld>
 </file>
 
-<file path=ppt/slides/slide9.xml><?xml version="1.0" encoding="utf-8"?>
+<file path=ppt/slides/slide8.xml><?xml version="1.0" encoding="utf-8"?>
 <p:sld xmlns:a="http://schemas.openxmlformats.org/drawingml/2006/main" xmlns:r="http://schemas.openxmlformats.org/officeDocument/2006/relationships" xmlns:mc="http://schemas.openxmlformats.org/markup-compatibility/2006" xmlns:mv="urn:schemas-microsoft-com:mac:vml" xmlns:p="http://schemas.openxmlformats.org/presentationml/2006/main" xmlns:c="http://schemas.openxmlformats.org/drawingml/2006/chart" xmlns:dgm="http://schemas.openxmlformats.org/drawingml/2006/diagram" xmlns:o="urn:schemas-microsoft-com:office:office" xmlns:v="urn:schemas-microsoft-com:vml" xmlns:pvml="urn:schemas-microsoft-com:office:powerpoint" xmlns:com="http://schemas.openxmlformats.org/drawingml/2006/compatibility" xmlns:p14="http://schemas.microsoft.com/office/powerpoint/2010/main" xmlns:p15="http://schemas.microsoft.com/office/powerpoint/2012/main">
   <p:cSld>
     <p:spTree>
       <p:nvGrpSpPr>
-        <p:cNvPr id="162" name="Shape 162"/>
+        <p:cNvPr id="155" name="Shape 155"/>
         <p:cNvGrpSpPr/>
         <p:nvPr/>
       </p:nvGrpSpPr>
@@ -12613,7 +11556,7 @@
       </p:grpSpPr>
       <p:sp>
         <p:nvSpPr>
-          <p:cNvPr id="163" name="Google Shape;163;p25"/>
+          <p:cNvPr id="156" name="Google Shape;156;p24"/>
           <p:cNvSpPr txBox="1"/>
           <p:nvPr>
             <p:ph type="title"/>
@@ -12653,7 +11596,7 @@
       </p:sp>
       <p:pic>
         <p:nvPicPr>
-          <p:cNvPr id="164" name="Google Shape;164;p25"/>
+          <p:cNvPr id="157" name="Google Shape;157;p24"/>
           <p:cNvPicPr preferRelativeResize="0"/>
           <p:nvPr/>
         </p:nvPicPr>
@@ -12687,7 +11630,555 @@
 </p:sld>
 </file>
 
+<file path=ppt/slides/slide9.xml><?xml version="1.0" encoding="utf-8"?>
+<p:sld xmlns:a="http://schemas.openxmlformats.org/drawingml/2006/main" xmlns:r="http://schemas.openxmlformats.org/officeDocument/2006/relationships" xmlns:mc="http://schemas.openxmlformats.org/markup-compatibility/2006" xmlns:mv="urn:schemas-microsoft-com:mac:vml" xmlns:p="http://schemas.openxmlformats.org/presentationml/2006/main" xmlns:c="http://schemas.openxmlformats.org/drawingml/2006/chart" xmlns:dgm="http://schemas.openxmlformats.org/drawingml/2006/diagram" xmlns:o="urn:schemas-microsoft-com:office:office" xmlns:v="urn:schemas-microsoft-com:vml" xmlns:pvml="urn:schemas-microsoft-com:office:powerpoint" xmlns:com="http://schemas.openxmlformats.org/drawingml/2006/compatibility" xmlns:p14="http://schemas.microsoft.com/office/powerpoint/2010/main" xmlns:p15="http://schemas.microsoft.com/office/powerpoint/2012/main">
+  <p:cSld>
+    <p:spTree>
+      <p:nvGrpSpPr>
+        <p:cNvPr id="161" name="Shape 161"/>
+        <p:cNvGrpSpPr/>
+        <p:nvPr/>
+      </p:nvGrpSpPr>
+      <p:grpSpPr>
+        <a:xfrm>
+          <a:off x="0" y="0"/>
+          <a:ext cx="0" cy="0"/>
+          <a:chOff x="0" y="0"/>
+          <a:chExt cx="0" cy="0"/>
+        </a:xfrm>
+      </p:grpSpPr>
+      <p:sp>
+        <p:nvSpPr>
+          <p:cNvPr id="162" name="Google Shape;162;p25"/>
+          <p:cNvSpPr txBox="1"/>
+          <p:nvPr>
+            <p:ph idx="1" type="body"/>
+          </p:nvPr>
+        </p:nvSpPr>
+        <p:spPr>
+          <a:xfrm>
+            <a:off x="1919225" y="1160050"/>
+            <a:ext cx="6803400" cy="469800"/>
+          </a:xfrm>
+          <a:prstGeom prst="rect">
+            <a:avLst/>
+          </a:prstGeom>
+          <a:ln>
+            <a:noFill/>
+          </a:ln>
+        </p:spPr>
+        <p:txBody>
+          <a:bodyPr anchorCtr="0" anchor="t" bIns="91425" lIns="91425" spcFirstLastPara="1" rIns="91425" wrap="square" tIns="91425">
+            <a:noAutofit/>
+          </a:bodyPr>
+          <a:lstStyle/>
+          <a:p>
+            <a:pPr indent="0" lvl="0" marL="0" rtl="0" algn="l">
+              <a:spcBef>
+                <a:spcPts val="0"/>
+              </a:spcBef>
+              <a:spcAft>
+                <a:spcPts val="1600"/>
+              </a:spcAft>
+              <a:buNone/>
+            </a:pPr>
+            <a:r>
+              <a:rPr lang="it">
+                <a:solidFill>
+                  <a:schemeClr val="lt2"/>
+                </a:solidFill>
+              </a:rPr>
+              <a:t>mongoDB</a:t>
+            </a:r>
+            <a:endParaRPr>
+              <a:solidFill>
+                <a:schemeClr val="lt2"/>
+              </a:solidFill>
+            </a:endParaRPr>
+          </a:p>
+        </p:txBody>
+      </p:sp>
+      <p:sp>
+        <p:nvSpPr>
+          <p:cNvPr id="163" name="Google Shape;163;p25"/>
+          <p:cNvSpPr txBox="1"/>
+          <p:nvPr>
+            <p:ph type="title"/>
+          </p:nvPr>
+        </p:nvSpPr>
+        <p:spPr>
+          <a:xfrm>
+            <a:off x="1297500" y="393750"/>
+            <a:ext cx="7038900" cy="914100"/>
+          </a:xfrm>
+          <a:prstGeom prst="rect">
+            <a:avLst/>
+          </a:prstGeom>
+        </p:spPr>
+        <p:txBody>
+          <a:bodyPr anchorCtr="0" anchor="t" bIns="91425" lIns="91425" spcFirstLastPara="1" rIns="91425" wrap="square" tIns="91425">
+            <a:noAutofit/>
+          </a:bodyPr>
+          <a:lstStyle/>
+          <a:p>
+            <a:pPr indent="0" lvl="0" marL="0" rtl="0" algn="l">
+              <a:spcBef>
+                <a:spcPts val="0"/>
+              </a:spcBef>
+              <a:spcAft>
+                <a:spcPts val="0"/>
+              </a:spcAft>
+              <a:buNone/>
+            </a:pPr>
+            <a:r>
+              <a:rPr lang="it"/>
+              <a:t>tecnologie e architettura</a:t>
+            </a:r>
+            <a:endParaRPr/>
+          </a:p>
+        </p:txBody>
+      </p:sp>
+      <p:sp>
+        <p:nvSpPr>
+          <p:cNvPr id="164" name="Google Shape;164;p25"/>
+          <p:cNvSpPr txBox="1"/>
+          <p:nvPr>
+            <p:ph idx="1" type="body"/>
+          </p:nvPr>
+        </p:nvSpPr>
+        <p:spPr>
+          <a:xfrm>
+            <a:off x="2415725" y="1629850"/>
+            <a:ext cx="6803400" cy="469800"/>
+          </a:xfrm>
+          <a:prstGeom prst="rect">
+            <a:avLst/>
+          </a:prstGeom>
+          <a:ln>
+            <a:noFill/>
+          </a:ln>
+        </p:spPr>
+        <p:txBody>
+          <a:bodyPr anchorCtr="0" anchor="t" bIns="91425" lIns="91425" spcFirstLastPara="1" rIns="91425" wrap="square" tIns="91425">
+            <a:noAutofit/>
+          </a:bodyPr>
+          <a:lstStyle/>
+          <a:p>
+            <a:pPr indent="0" lvl="0" marL="0" rtl="0" algn="l">
+              <a:spcBef>
+                <a:spcPts val="0"/>
+              </a:spcBef>
+              <a:spcAft>
+                <a:spcPts val="1600"/>
+              </a:spcAft>
+              <a:buNone/>
+            </a:pPr>
+            <a:r>
+              <a:rPr lang="it">
+                <a:solidFill>
+                  <a:schemeClr val="lt2"/>
+                </a:solidFill>
+              </a:rPr>
+              <a:t>AWS - lambda, API gateway</a:t>
+            </a:r>
+            <a:endParaRPr>
+              <a:solidFill>
+                <a:schemeClr val="lt2"/>
+              </a:solidFill>
+            </a:endParaRPr>
+          </a:p>
+        </p:txBody>
+      </p:sp>
+      <p:sp>
+        <p:nvSpPr>
+          <p:cNvPr id="165" name="Google Shape;165;p25"/>
+          <p:cNvSpPr txBox="1"/>
+          <p:nvPr>
+            <p:ph idx="1" type="body"/>
+          </p:nvPr>
+        </p:nvSpPr>
+        <p:spPr>
+          <a:xfrm>
+            <a:off x="2793000" y="2099650"/>
+            <a:ext cx="6803400" cy="469800"/>
+          </a:xfrm>
+          <a:prstGeom prst="rect">
+            <a:avLst/>
+          </a:prstGeom>
+          <a:ln>
+            <a:noFill/>
+          </a:ln>
+        </p:spPr>
+        <p:txBody>
+          <a:bodyPr anchorCtr="0" anchor="t" bIns="91425" lIns="91425" spcFirstLastPara="1" rIns="91425" wrap="square" tIns="91425">
+            <a:noAutofit/>
+          </a:bodyPr>
+          <a:lstStyle/>
+          <a:p>
+            <a:pPr indent="0" lvl="0" marL="0" rtl="0" algn="l">
+              <a:spcBef>
+                <a:spcPts val="0"/>
+              </a:spcBef>
+              <a:spcAft>
+                <a:spcPts val="1600"/>
+              </a:spcAft>
+              <a:buNone/>
+            </a:pPr>
+            <a:r>
+              <a:rPr lang="it">
+                <a:solidFill>
+                  <a:schemeClr val="lt2"/>
+                </a:solidFill>
+              </a:rPr>
+              <a:t>GitHub repository</a:t>
+            </a:r>
+            <a:endParaRPr>
+              <a:solidFill>
+                <a:schemeClr val="lt2"/>
+              </a:solidFill>
+            </a:endParaRPr>
+          </a:p>
+        </p:txBody>
+      </p:sp>
+      <p:sp>
+        <p:nvSpPr>
+          <p:cNvPr id="166" name="Google Shape;166;p25"/>
+          <p:cNvSpPr txBox="1"/>
+          <p:nvPr>
+            <p:ph idx="1" type="body"/>
+          </p:nvPr>
+        </p:nvSpPr>
+        <p:spPr>
+          <a:xfrm>
+            <a:off x="3325700" y="2569450"/>
+            <a:ext cx="6803400" cy="469800"/>
+          </a:xfrm>
+          <a:prstGeom prst="rect">
+            <a:avLst/>
+          </a:prstGeom>
+          <a:ln>
+            <a:noFill/>
+          </a:ln>
+        </p:spPr>
+        <p:txBody>
+          <a:bodyPr anchorCtr="0" anchor="t" bIns="91425" lIns="91425" spcFirstLastPara="1" rIns="91425" wrap="square" tIns="91425">
+            <a:noAutofit/>
+          </a:bodyPr>
+          <a:lstStyle/>
+          <a:p>
+            <a:pPr indent="0" lvl="0" marL="0" rtl="0" algn="l">
+              <a:spcBef>
+                <a:spcPts val="0"/>
+              </a:spcBef>
+              <a:spcAft>
+                <a:spcPts val="1600"/>
+              </a:spcAft>
+              <a:buNone/>
+            </a:pPr>
+            <a:r>
+              <a:rPr lang="it">
+                <a:solidFill>
+                  <a:schemeClr val="lt2"/>
+                </a:solidFill>
+              </a:rPr>
+              <a:t>smartphone android/iOS</a:t>
+            </a:r>
+            <a:endParaRPr>
+              <a:solidFill>
+                <a:schemeClr val="lt2"/>
+              </a:solidFill>
+            </a:endParaRPr>
+          </a:p>
+        </p:txBody>
+      </p:sp>
+    </p:spTree>
+  </p:cSld>
+  <p:clrMapOvr>
+    <a:masterClrMapping/>
+  </p:clrMapOvr>
+</p:sld>
+</file>
+
 <file path=ppt/theme/theme1.xml><?xml version="1.0" encoding="utf-8"?>
+<a:theme xmlns:a="http://schemas.openxmlformats.org/drawingml/2006/main" xmlns:r="http://schemas.openxmlformats.org/officeDocument/2006/relationships" name="Simple Dark">
+  <a:themeElements>
+    <a:clrScheme name="Simple Dark">
+      <a:dk1>
+        <a:srgbClr val="FFFFFF"/>
+      </a:dk1>
+      <a:lt1>
+        <a:srgbClr val="212121"/>
+      </a:lt1>
+      <a:dk2>
+        <a:srgbClr val="303030"/>
+      </a:dk2>
+      <a:lt2>
+        <a:srgbClr val="ADADAD"/>
+      </a:lt2>
+      <a:accent1>
+        <a:srgbClr val="009688"/>
+      </a:accent1>
+      <a:accent2>
+        <a:srgbClr val="EEEEEE"/>
+      </a:accent2>
+      <a:accent3>
+        <a:srgbClr val="78909C"/>
+      </a:accent3>
+      <a:accent4>
+        <a:srgbClr val="FFAB40"/>
+      </a:accent4>
+      <a:accent5>
+        <a:srgbClr val="4DD0E1"/>
+      </a:accent5>
+      <a:accent6>
+        <a:srgbClr val="EEFF41"/>
+      </a:accent6>
+      <a:hlink>
+        <a:srgbClr val="4DD0E1"/>
+      </a:hlink>
+      <a:folHlink>
+        <a:srgbClr val="4DD0E1"/>
+      </a:folHlink>
+    </a:clrScheme>
+    <a:fontScheme name="Office">
+      <a:majorFont>
+        <a:latin typeface="Arial"/>
+        <a:ea typeface=""/>
+        <a:cs typeface=""/>
+        <a:font script="Jpan" typeface="ＭＳ Ｐゴシック"/>
+        <a:font script="Hang" typeface="맑은 고딕"/>
+        <a:font script="Hans" typeface="宋体"/>
+        <a:font script="Hant" typeface="新細明體"/>
+        <a:font script="Arab" typeface="Times New Roman"/>
+        <a:font script="Hebr" typeface="Times New Roman"/>
+        <a:font script="Thai" typeface="Angsana New"/>
+        <a:font script="Ethi" typeface="Nyala"/>
+        <a:font script="Beng" typeface="Vrinda"/>
+        <a:font script="Gujr" typeface="Shruti"/>
+        <a:font script="Khmr" typeface="MoolBoran"/>
+        <a:font script="Knda" typeface="Tunga"/>
+        <a:font script="Guru" typeface="Raavi"/>
+        <a:font script="Cans" typeface="Euphemia"/>
+        <a:font script="Cher" typeface="Plantagenet Cherokee"/>
+        <a:font script="Yiii" typeface="Microsoft Yi Baiti"/>
+        <a:font script="Tibt" typeface="Microsoft Himalaya"/>
+        <a:font script="Thaa" typeface="MV Boli"/>
+        <a:font script="Deva" typeface="Mangal"/>
+        <a:font script="Telu" typeface="Gautami"/>
+        <a:font script="Taml" typeface="Latha"/>
+        <a:font script="Syrc" typeface="Estrangelo Edessa"/>
+        <a:font script="Orya" typeface="Kalinga"/>
+        <a:font script="Mlym" typeface="Kartika"/>
+        <a:font script="Laoo" typeface="DokChampa"/>
+        <a:font script="Sinh" typeface="Iskoola Pota"/>
+        <a:font script="Mong" typeface="Mongolian Baiti"/>
+        <a:font script="Viet" typeface="Times New Roman"/>
+        <a:font script="Uigh" typeface="Microsoft Uighur"/>
+        <a:font script="Geor" typeface="Sylfaen"/>
+      </a:majorFont>
+      <a:minorFont>
+        <a:latin typeface="Arial"/>
+        <a:ea typeface=""/>
+        <a:cs typeface=""/>
+        <a:font script="Jpan" typeface="ＭＳ Ｐゴシック"/>
+        <a:font script="Hang" typeface="맑은 고딕"/>
+        <a:font script="Hans" typeface="宋体"/>
+        <a:font script="Hant" typeface="新細明體"/>
+        <a:font script="Arab" typeface="Arial"/>
+        <a:font script="Hebr" typeface="Arial"/>
+        <a:font script="Thai" typeface="Cordia New"/>
+        <a:font script="Ethi" typeface="Nyala"/>
+        <a:font script="Beng" typeface="Vrinda"/>
+        <a:font script="Gujr" typeface="Shruti"/>
+        <a:font script="Khmr" typeface="DaunPenh"/>
+        <a:font script="Knda" typeface="Tunga"/>
+        <a:font script="Guru" typeface="Raavi"/>
+        <a:font script="Cans" typeface="Euphemia"/>
+        <a:font script="Cher" typeface="Plantagenet Cherokee"/>
+        <a:font script="Yiii" typeface="Microsoft Yi Baiti"/>
+        <a:font script="Tibt" typeface="Microsoft Himalaya"/>
+        <a:font script="Thaa" typeface="MV Boli"/>
+        <a:font script="Deva" typeface="Mangal"/>
+        <a:font script="Telu" typeface="Gautami"/>
+        <a:font script="Taml" typeface="Latha"/>
+        <a:font script="Syrc" typeface="Estrangelo Edessa"/>
+        <a:font script="Orya" typeface="Kalinga"/>
+        <a:font script="Mlym" typeface="Kartika"/>
+        <a:font script="Laoo" typeface="DokChampa"/>
+        <a:font script="Sinh" typeface="Iskoola Pota"/>
+        <a:font script="Mong" typeface="Mongolian Baiti"/>
+        <a:font script="Viet" typeface="Arial"/>
+        <a:font script="Uigh" typeface="Microsoft Uighur"/>
+        <a:font script="Geor" typeface="Sylfaen"/>
+      </a:minorFont>
+    </a:fontScheme>
+    <a:fmtScheme name="Office">
+      <a:fillStyleLst>
+        <a:solidFill>
+          <a:schemeClr val="phClr"/>
+        </a:solidFill>
+        <a:gradFill rotWithShape="1">
+          <a:gsLst>
+            <a:gs pos="0">
+              <a:schemeClr val="phClr">
+                <a:tint val="50000"/>
+                <a:satMod val="300000"/>
+              </a:schemeClr>
+            </a:gs>
+            <a:gs pos="35000">
+              <a:schemeClr val="phClr">
+                <a:tint val="37000"/>
+                <a:satMod val="300000"/>
+              </a:schemeClr>
+            </a:gs>
+            <a:gs pos="100000">
+              <a:schemeClr val="phClr">
+                <a:tint val="15000"/>
+                <a:satMod val="350000"/>
+              </a:schemeClr>
+            </a:gs>
+          </a:gsLst>
+          <a:lin ang="16200000" scaled="1"/>
+        </a:gradFill>
+        <a:gradFill rotWithShape="1">
+          <a:gsLst>
+            <a:gs pos="0">
+              <a:schemeClr val="phClr">
+                <a:tint val="100000"/>
+                <a:shade val="100000"/>
+                <a:satMod val="130000"/>
+              </a:schemeClr>
+            </a:gs>
+            <a:gs pos="100000">
+              <a:schemeClr val="phClr">
+                <a:tint val="50000"/>
+                <a:shade val="100000"/>
+                <a:satMod val="350000"/>
+              </a:schemeClr>
+            </a:gs>
+          </a:gsLst>
+          <a:lin ang="16200000" scaled="0"/>
+        </a:gradFill>
+      </a:fillStyleLst>
+      <a:lnStyleLst>
+        <a:ln w="9525" cap="flat" cmpd="sng" algn="ctr">
+          <a:solidFill>
+            <a:schemeClr val="phClr">
+              <a:shade val="95000"/>
+              <a:satMod val="105000"/>
+            </a:schemeClr>
+          </a:solidFill>
+          <a:prstDash val="solid"/>
+        </a:ln>
+        <a:ln w="25400" cap="flat" cmpd="sng" algn="ctr">
+          <a:solidFill>
+            <a:schemeClr val="phClr"/>
+          </a:solidFill>
+          <a:prstDash val="solid"/>
+        </a:ln>
+        <a:ln w="38100" cap="flat" cmpd="sng" algn="ctr">
+          <a:solidFill>
+            <a:schemeClr val="phClr"/>
+          </a:solidFill>
+          <a:prstDash val="solid"/>
+        </a:ln>
+      </a:lnStyleLst>
+      <a:effectStyleLst>
+        <a:effectStyle>
+          <a:effectLst>
+            <a:outerShdw blurRad="40000" dist="20000" dir="5400000" rotWithShape="0">
+              <a:srgbClr val="000000">
+                <a:alpha val="38000"/>
+              </a:srgbClr>
+            </a:outerShdw>
+          </a:effectLst>
+        </a:effectStyle>
+        <a:effectStyle>
+          <a:effectLst>
+            <a:outerShdw blurRad="40000" dist="23000" dir="5400000" rotWithShape="0">
+              <a:srgbClr val="000000">
+                <a:alpha val="35000"/>
+              </a:srgbClr>
+            </a:outerShdw>
+          </a:effectLst>
+        </a:effectStyle>
+        <a:effectStyle>
+          <a:effectLst>
+            <a:outerShdw blurRad="40000" dist="23000" dir="5400000" rotWithShape="0">
+              <a:srgbClr val="000000">
+                <a:alpha val="35000"/>
+              </a:srgbClr>
+            </a:outerShdw>
+          </a:effectLst>
+          <a:scene3d>
+            <a:camera prst="orthographicFront">
+              <a:rot lat="0" lon="0" rev="0"/>
+            </a:camera>
+            <a:lightRig rig="threePt" dir="t">
+              <a:rot lat="0" lon="0" rev="1200000"/>
+            </a:lightRig>
+          </a:scene3d>
+          <a:sp3d>
+            <a:bevelT w="63500" h="25400"/>
+          </a:sp3d>
+        </a:effectStyle>
+      </a:effectStyleLst>
+      <a:bgFillStyleLst>
+        <a:solidFill>
+          <a:schemeClr val="phClr"/>
+        </a:solidFill>
+        <a:gradFill rotWithShape="1">
+          <a:gsLst>
+            <a:gs pos="0">
+              <a:schemeClr val="phClr">
+                <a:tint val="40000"/>
+                <a:satMod val="350000"/>
+              </a:schemeClr>
+            </a:gs>
+            <a:gs pos="40000">
+              <a:schemeClr val="phClr">
+                <a:tint val="45000"/>
+                <a:shade val="99000"/>
+                <a:satMod val="350000"/>
+              </a:schemeClr>
+            </a:gs>
+            <a:gs pos="100000">
+              <a:schemeClr val="phClr">
+                <a:shade val="20000"/>
+                <a:satMod val="255000"/>
+              </a:schemeClr>
+            </a:gs>
+          </a:gsLst>
+          <a:path path="circle">
+            <a:fillToRect l="50000" t="-80000" r="50000" b="180000"/>
+          </a:path>
+        </a:gradFill>
+        <a:gradFill rotWithShape="1">
+          <a:gsLst>
+            <a:gs pos="0">
+              <a:schemeClr val="phClr">
+                <a:tint val="80000"/>
+                <a:satMod val="300000"/>
+              </a:schemeClr>
+            </a:gs>
+            <a:gs pos="100000">
+              <a:schemeClr val="phClr">
+                <a:shade val="30000"/>
+                <a:satMod val="200000"/>
+              </a:schemeClr>
+            </a:gs>
+          </a:gsLst>
+          <a:path path="circle">
+            <a:fillToRect l="50000" t="50000" r="50000" b="50000"/>
+          </a:path>
+        </a:gradFill>
+      </a:bgFillStyleLst>
+    </a:fmtScheme>
+  </a:themeElements>
+</a:theme>
+</file>
+
+<file path=ppt/theme/theme2.xml><?xml version="1.0" encoding="utf-8"?>
 <a:theme xmlns:a="http://schemas.openxmlformats.org/drawingml/2006/main" xmlns:r="http://schemas.openxmlformats.org/officeDocument/2006/relationships">
   <a:themeElements>
     <a:clrScheme name="Default">
@@ -12964,283 +12455,4 @@
     </a:fmtScheme>
   </a:themeElements>
 </a:theme>
-</file>
-
-<file path=ppt/theme/theme2.xml><?xml version="1.0" encoding="utf-8"?>
-<a:theme xmlns:a="http://schemas.openxmlformats.org/drawingml/2006/main" xmlns:r="http://schemas.openxmlformats.org/officeDocument/2006/relationships" name="Simple Dark">
-  <a:themeElements>
-    <a:clrScheme name="Simple Dark">
-      <a:dk1>
-        <a:srgbClr val="FFFFFF"/>
-      </a:dk1>
-      <a:lt1>
-        <a:srgbClr val="212121"/>
-      </a:lt1>
-      <a:dk2>
-        <a:srgbClr val="303030"/>
-      </a:dk2>
-      <a:lt2>
-        <a:srgbClr val="ADADAD"/>
-      </a:lt2>
-      <a:accent1>
-        <a:srgbClr val="009688"/>
-      </a:accent1>
-      <a:accent2>
-        <a:srgbClr val="EEEEEE"/>
-      </a:accent2>
-      <a:accent3>
-        <a:srgbClr val="78909C"/>
-      </a:accent3>
-      <a:accent4>
-        <a:srgbClr val="FFAB40"/>
-      </a:accent4>
-      <a:accent5>
-        <a:srgbClr val="4DD0E1"/>
-      </a:accent5>
-      <a:accent6>
-        <a:srgbClr val="EEFF41"/>
-      </a:accent6>
-      <a:hlink>
-        <a:srgbClr val="4DD0E1"/>
-      </a:hlink>
-      <a:folHlink>
-        <a:srgbClr val="4DD0E1"/>
-      </a:folHlink>
-    </a:clrScheme>
-    <a:fontScheme name="Office">
-      <a:majorFont>
-        <a:latin typeface="Arial"/>
-        <a:ea typeface=""/>
-        <a:cs typeface=""/>
-        <a:font script="Jpan" typeface="ＭＳ Ｐゴシック"/>
-        <a:font script="Hang" typeface="맑은 고딕"/>
-        <a:font script="Hans" typeface="宋体"/>
-        <a:font script="Hant" typeface="新細明體"/>
-        <a:font script="Arab" typeface="Times New Roman"/>
-        <a:font script="Hebr" typeface="Times New Roman"/>
-        <a:font script="Thai" typeface="Angsana New"/>
-        <a:font script="Ethi" typeface="Nyala"/>
-        <a:font script="Beng" typeface="Vrinda"/>
-        <a:font script="Gujr" typeface="Shruti"/>
-        <a:font script="Khmr" typeface="MoolBoran"/>
-        <a:font script="Knda" typeface="Tunga"/>
-        <a:font script="Guru" typeface="Raavi"/>
-        <a:font script="Cans" typeface="Euphemia"/>
-        <a:font script="Cher" typeface="Plantagenet Cherokee"/>
-        <a:font script="Yiii" typeface="Microsoft Yi Baiti"/>
-        <a:font script="Tibt" typeface="Microsoft Himalaya"/>
-        <a:font script="Thaa" typeface="MV Boli"/>
-        <a:font script="Deva" typeface="Mangal"/>
-        <a:font script="Telu" typeface="Gautami"/>
-        <a:font script="Taml" typeface="Latha"/>
-        <a:font script="Syrc" typeface="Estrangelo Edessa"/>
-        <a:font script="Orya" typeface="Kalinga"/>
-        <a:font script="Mlym" typeface="Kartika"/>
-        <a:font script="Laoo" typeface="DokChampa"/>
-        <a:font script="Sinh" typeface="Iskoola Pota"/>
-        <a:font script="Mong" typeface="Mongolian Baiti"/>
-        <a:font script="Viet" typeface="Times New Roman"/>
-        <a:font script="Uigh" typeface="Microsoft Uighur"/>
-        <a:font script="Geor" typeface="Sylfaen"/>
-      </a:majorFont>
-      <a:minorFont>
-        <a:latin typeface="Arial"/>
-        <a:ea typeface=""/>
-        <a:cs typeface=""/>
-        <a:font script="Jpan" typeface="ＭＳ Ｐゴシック"/>
-        <a:font script="Hang" typeface="맑은 고딕"/>
-        <a:font script="Hans" typeface="宋体"/>
-        <a:font script="Hant" typeface="新細明體"/>
-        <a:font script="Arab" typeface="Arial"/>
-        <a:font script="Hebr" typeface="Arial"/>
-        <a:font script="Thai" typeface="Cordia New"/>
-        <a:font script="Ethi" typeface="Nyala"/>
-        <a:font script="Beng" typeface="Vrinda"/>
-        <a:font script="Gujr" typeface="Shruti"/>
-        <a:font script="Khmr" typeface="DaunPenh"/>
-        <a:font script="Knda" typeface="Tunga"/>
-        <a:font script="Guru" typeface="Raavi"/>
-        <a:font script="Cans" typeface="Euphemia"/>
-        <a:font script="Cher" typeface="Plantagenet Cherokee"/>
-        <a:font script="Yiii" typeface="Microsoft Yi Baiti"/>
-        <a:font script="Tibt" typeface="Microsoft Himalaya"/>
-        <a:font script="Thaa" typeface="MV Boli"/>
-        <a:font script="Deva" typeface="Mangal"/>
-        <a:font script="Telu" typeface="Gautami"/>
-        <a:font script="Taml" typeface="Latha"/>
-        <a:font script="Syrc" typeface="Estrangelo Edessa"/>
-        <a:font script="Orya" typeface="Kalinga"/>
-        <a:font script="Mlym" typeface="Kartika"/>
-        <a:font script="Laoo" typeface="DokChampa"/>
-        <a:font script="Sinh" typeface="Iskoola Pota"/>
-        <a:font script="Mong" typeface="Mongolian Baiti"/>
-        <a:font script="Viet" typeface="Arial"/>
-        <a:font script="Uigh" typeface="Microsoft Uighur"/>
-        <a:font script="Geor" typeface="Sylfaen"/>
-      </a:minorFont>
-    </a:fontScheme>
-    <a:fmtScheme name="Office">
-      <a:fillStyleLst>
-        <a:solidFill>
-          <a:schemeClr val="phClr"/>
-        </a:solidFill>
-        <a:gradFill rotWithShape="1">
-          <a:gsLst>
-            <a:gs pos="0">
-              <a:schemeClr val="phClr">
-                <a:tint val="50000"/>
-                <a:satMod val="300000"/>
-              </a:schemeClr>
-            </a:gs>
-            <a:gs pos="35000">
-              <a:schemeClr val="phClr">
-                <a:tint val="37000"/>
-                <a:satMod val="300000"/>
-              </a:schemeClr>
-            </a:gs>
-            <a:gs pos="100000">
-              <a:schemeClr val="phClr">
-                <a:tint val="15000"/>
-                <a:satMod val="350000"/>
-              </a:schemeClr>
-            </a:gs>
-          </a:gsLst>
-          <a:lin ang="16200000" scaled="1"/>
-        </a:gradFill>
-        <a:gradFill rotWithShape="1">
-          <a:gsLst>
-            <a:gs pos="0">
-              <a:schemeClr val="phClr">
-                <a:tint val="100000"/>
-                <a:shade val="100000"/>
-                <a:satMod val="130000"/>
-              </a:schemeClr>
-            </a:gs>
-            <a:gs pos="100000">
-              <a:schemeClr val="phClr">
-                <a:tint val="50000"/>
-                <a:shade val="100000"/>
-                <a:satMod val="350000"/>
-              </a:schemeClr>
-            </a:gs>
-          </a:gsLst>
-          <a:lin ang="16200000" scaled="0"/>
-        </a:gradFill>
-      </a:fillStyleLst>
-      <a:lnStyleLst>
-        <a:ln w="9525" cap="flat" cmpd="sng" algn="ctr">
-          <a:solidFill>
-            <a:schemeClr val="phClr">
-              <a:shade val="95000"/>
-              <a:satMod val="105000"/>
-            </a:schemeClr>
-          </a:solidFill>
-          <a:prstDash val="solid"/>
-        </a:ln>
-        <a:ln w="25400" cap="flat" cmpd="sng" algn="ctr">
-          <a:solidFill>
-            <a:schemeClr val="phClr"/>
-          </a:solidFill>
-          <a:prstDash val="solid"/>
-        </a:ln>
-        <a:ln w="38100" cap="flat" cmpd="sng" algn="ctr">
-          <a:solidFill>
-            <a:schemeClr val="phClr"/>
-          </a:solidFill>
-          <a:prstDash val="solid"/>
-        </a:ln>
-      </a:lnStyleLst>
-      <a:effectStyleLst>
-        <a:effectStyle>
-          <a:effectLst>
-            <a:outerShdw blurRad="40000" dist="20000" dir="5400000" rotWithShape="0">
-              <a:srgbClr val="000000">
-                <a:alpha val="38000"/>
-              </a:srgbClr>
-            </a:outerShdw>
-          </a:effectLst>
-        </a:effectStyle>
-        <a:effectStyle>
-          <a:effectLst>
-            <a:outerShdw blurRad="40000" dist="23000" dir="5400000" rotWithShape="0">
-              <a:srgbClr val="000000">
-                <a:alpha val="35000"/>
-              </a:srgbClr>
-            </a:outerShdw>
-          </a:effectLst>
-        </a:effectStyle>
-        <a:effectStyle>
-          <a:effectLst>
-            <a:outerShdw blurRad="40000" dist="23000" dir="5400000" rotWithShape="0">
-              <a:srgbClr val="000000">
-                <a:alpha val="35000"/>
-              </a:srgbClr>
-            </a:outerShdw>
-          </a:effectLst>
-          <a:scene3d>
-            <a:camera prst="orthographicFront">
-              <a:rot lat="0" lon="0" rev="0"/>
-            </a:camera>
-            <a:lightRig rig="threePt" dir="t">
-              <a:rot lat="0" lon="0" rev="1200000"/>
-            </a:lightRig>
-          </a:scene3d>
-          <a:sp3d>
-            <a:bevelT w="63500" h="25400"/>
-          </a:sp3d>
-        </a:effectStyle>
-      </a:effectStyleLst>
-      <a:bgFillStyleLst>
-        <a:solidFill>
-          <a:schemeClr val="phClr"/>
-        </a:solidFill>
-        <a:gradFill rotWithShape="1">
-          <a:gsLst>
-            <a:gs pos="0">
-              <a:schemeClr val="phClr">
-                <a:tint val="40000"/>
-                <a:satMod val="350000"/>
-              </a:schemeClr>
-            </a:gs>
-            <a:gs pos="40000">
-              <a:schemeClr val="phClr">
-                <a:tint val="45000"/>
-                <a:shade val="99000"/>
-                <a:satMod val="350000"/>
-              </a:schemeClr>
-            </a:gs>
-            <a:gs pos="100000">
-              <a:schemeClr val="phClr">
-                <a:shade val="20000"/>
-                <a:satMod val="255000"/>
-              </a:schemeClr>
-            </a:gs>
-          </a:gsLst>
-          <a:path path="circle">
-            <a:fillToRect l="50000" t="-80000" r="50000" b="180000"/>
-          </a:path>
-        </a:gradFill>
-        <a:gradFill rotWithShape="1">
-          <a:gsLst>
-            <a:gs pos="0">
-              <a:schemeClr val="phClr">
-                <a:tint val="80000"/>
-                <a:satMod val="300000"/>
-              </a:schemeClr>
-            </a:gs>
-            <a:gs pos="100000">
-              <a:schemeClr val="phClr">
-                <a:shade val="30000"/>
-                <a:satMod val="200000"/>
-              </a:schemeClr>
-            </a:gs>
-          </a:gsLst>
-          <a:path path="circle">
-            <a:fillToRect l="50000" t="50000" r="50000" b="50000"/>
-          </a:path>
-        </a:gradFill>
-      </a:bgFillStyleLst>
-    </a:fmtScheme>
-  </a:themeElements>
-</a:theme>
 </file>
</xml_diff>